<commit_message>
add demo video slide to presentation
</commit_message>
<xml_diff>
--- a/Research/Pitch Draft 4.pptx
+++ b/Research/Pitch Draft 4.pptx
@@ -7,9 +7,10 @@
   <p:sldIdLst>
     <p:sldId id="256" r:id="rId2"/>
     <p:sldId id="257" r:id="rId3"/>
-    <p:sldId id="258" r:id="rId4"/>
-    <p:sldId id="261" r:id="rId5"/>
-    <p:sldId id="262" r:id="rId6"/>
+    <p:sldId id="263" r:id="rId4"/>
+    <p:sldId id="258" r:id="rId5"/>
+    <p:sldId id="261" r:id="rId6"/>
+    <p:sldId id="262" r:id="rId7"/>
   </p:sldIdLst>
   <p:sldSz cx="12192000" cy="6858000"/>
   <p:notesSz cx="6858000" cy="9144000"/>
@@ -618,7 +619,7 @@
           <a:p>
             <a:fld id="{6A35B1F1-B55C-4230-B19E-D1BE60CCE15D}" type="datetimeFigureOut">
               <a:rPr lang="en-US" smtClean="0"/>
-              <a:t>04-Mar-19</a:t>
+              <a:t>3/5/2019</a:t>
             </a:fld>
             <a:endParaRPr lang="en-US"/>
           </a:p>
@@ -914,7 +915,7 @@
           <a:p>
             <a:fld id="{6A35B1F1-B55C-4230-B19E-D1BE60CCE15D}" type="datetimeFigureOut">
               <a:rPr lang="en-US" smtClean="0"/>
-              <a:t>04-Mar-19</a:t>
+              <a:t>3/5/2019</a:t>
             </a:fld>
             <a:endParaRPr lang="en-US"/>
           </a:p>
@@ -1162,7 +1163,7 @@
           <a:p>
             <a:fld id="{6A35B1F1-B55C-4230-B19E-D1BE60CCE15D}" type="datetimeFigureOut">
               <a:rPr lang="en-US" smtClean="0"/>
-              <a:t>04-Mar-19</a:t>
+              <a:t>3/5/2019</a:t>
             </a:fld>
             <a:endParaRPr lang="en-US"/>
           </a:p>
@@ -1702,7 +1703,7 @@
           <a:p>
             <a:fld id="{6A35B1F1-B55C-4230-B19E-D1BE60CCE15D}" type="datetimeFigureOut">
               <a:rPr lang="en-US" smtClean="0"/>
-              <a:t>04-Mar-19</a:t>
+              <a:t>3/5/2019</a:t>
             </a:fld>
             <a:endParaRPr lang="en-US"/>
           </a:p>
@@ -1950,7 +1951,7 @@
           <a:p>
             <a:fld id="{6A35B1F1-B55C-4230-B19E-D1BE60CCE15D}" type="datetimeFigureOut">
               <a:rPr lang="en-US" smtClean="0"/>
-              <a:t>04-Mar-19</a:t>
+              <a:t>3/5/2019</a:t>
             </a:fld>
             <a:endParaRPr lang="en-US"/>
           </a:p>
@@ -2482,7 +2483,7 @@
           <a:p>
             <a:fld id="{6A35B1F1-B55C-4230-B19E-D1BE60CCE15D}" type="datetimeFigureOut">
               <a:rPr lang="en-US" smtClean="0"/>
-              <a:t>04-Mar-19</a:t>
+              <a:t>3/5/2019</a:t>
             </a:fld>
             <a:endParaRPr lang="en-US"/>
           </a:p>
@@ -2779,7 +2780,7 @@
           <a:p>
             <a:fld id="{6A35B1F1-B55C-4230-B19E-D1BE60CCE15D}" type="datetimeFigureOut">
               <a:rPr lang="en-US" smtClean="0"/>
-              <a:t>04-Mar-19</a:t>
+              <a:t>3/5/2019</a:t>
             </a:fld>
             <a:endParaRPr lang="en-US"/>
           </a:p>
@@ -2953,7 +2954,7 @@
           <a:p>
             <a:fld id="{6A35B1F1-B55C-4230-B19E-D1BE60CCE15D}" type="datetimeFigureOut">
               <a:rPr lang="en-US" smtClean="0"/>
-              <a:t>04-Mar-19</a:t>
+              <a:t>3/5/2019</a:t>
             </a:fld>
             <a:endParaRPr lang="en-US"/>
           </a:p>
@@ -3133,7 +3134,7 @@
           <a:p>
             <a:fld id="{6A35B1F1-B55C-4230-B19E-D1BE60CCE15D}" type="datetimeFigureOut">
               <a:rPr lang="en-US" smtClean="0"/>
-              <a:t>04-Mar-19</a:t>
+              <a:t>3/5/2019</a:t>
             </a:fld>
             <a:endParaRPr lang="en-US"/>
           </a:p>
@@ -3303,7 +3304,7 @@
           <a:p>
             <a:fld id="{6A35B1F1-B55C-4230-B19E-D1BE60CCE15D}" type="datetimeFigureOut">
               <a:rPr lang="en-US" smtClean="0"/>
-              <a:t>04-Mar-19</a:t>
+              <a:t>3/5/2019</a:t>
             </a:fld>
             <a:endParaRPr lang="en-US"/>
           </a:p>
@@ -3554,7 +3555,7 @@
           <a:p>
             <a:fld id="{6A35B1F1-B55C-4230-B19E-D1BE60CCE15D}" type="datetimeFigureOut">
               <a:rPr lang="en-US" smtClean="0"/>
-              <a:t>04-Mar-19</a:t>
+              <a:t>3/5/2019</a:t>
             </a:fld>
             <a:endParaRPr lang="en-US"/>
           </a:p>
@@ -3851,7 +3852,7 @@
           <a:p>
             <a:fld id="{6A35B1F1-B55C-4230-B19E-D1BE60CCE15D}" type="datetimeFigureOut">
               <a:rPr lang="en-US" smtClean="0"/>
-              <a:t>04-Mar-19</a:t>
+              <a:t>3/5/2019</a:t>
             </a:fld>
             <a:endParaRPr lang="en-US"/>
           </a:p>
@@ -4293,7 +4294,7 @@
           <a:p>
             <a:fld id="{6A35B1F1-B55C-4230-B19E-D1BE60CCE15D}" type="datetimeFigureOut">
               <a:rPr lang="en-US" smtClean="0"/>
-              <a:t>04-Mar-19</a:t>
+              <a:t>3/5/2019</a:t>
             </a:fld>
             <a:endParaRPr lang="en-US"/>
           </a:p>
@@ -4411,7 +4412,7 @@
           <a:p>
             <a:fld id="{6A35B1F1-B55C-4230-B19E-D1BE60CCE15D}" type="datetimeFigureOut">
               <a:rPr lang="en-US" smtClean="0"/>
-              <a:t>04-Mar-19</a:t>
+              <a:t>3/5/2019</a:t>
             </a:fld>
             <a:endParaRPr lang="en-US"/>
           </a:p>
@@ -4506,7 +4507,7 @@
           <a:p>
             <a:fld id="{6A35B1F1-B55C-4230-B19E-D1BE60CCE15D}" type="datetimeFigureOut">
               <a:rPr lang="en-US" smtClean="0"/>
-              <a:t>04-Mar-19</a:t>
+              <a:t>3/5/2019</a:t>
             </a:fld>
             <a:endParaRPr lang="en-US"/>
           </a:p>
@@ -4789,7 +4790,7 @@
           <a:p>
             <a:fld id="{6A35B1F1-B55C-4230-B19E-D1BE60CCE15D}" type="datetimeFigureOut">
               <a:rPr lang="en-US" smtClean="0"/>
-              <a:t>04-Mar-19</a:t>
+              <a:t>3/5/2019</a:t>
             </a:fld>
             <a:endParaRPr lang="en-US"/>
           </a:p>
@@ -5080,7 +5081,7 @@
           <a:p>
             <a:fld id="{6A35B1F1-B55C-4230-B19E-D1BE60CCE15D}" type="datetimeFigureOut">
               <a:rPr lang="en-US" smtClean="0"/>
-              <a:t>04-Mar-19</a:t>
+              <a:t>3/5/2019</a:t>
             </a:fld>
             <a:endParaRPr lang="en-US"/>
           </a:p>
@@ -5610,7 +5611,7 @@
           <a:p>
             <a:fld id="{6A35B1F1-B55C-4230-B19E-D1BE60CCE15D}" type="datetimeFigureOut">
               <a:rPr lang="en-US" smtClean="0"/>
-              <a:t>04-Mar-19</a:t>
+              <a:t>3/5/2019</a:t>
             </a:fld>
             <a:endParaRPr lang="en-US"/>
           </a:p>
@@ -7976,6 +7977,803 @@
     <p:bg>
       <p:bgPr>
         <a:blipFill rotWithShape="1">
+          <a:blip r:embed="rId3">
+            <a:duotone>
+              <a:schemeClr val="bg2">
+                <a:shade val="76000"/>
+                <a:satMod val="180000"/>
+              </a:schemeClr>
+              <a:schemeClr val="bg2">
+                <a:tint val="80000"/>
+                <a:satMod val="120000"/>
+                <a:lumMod val="180000"/>
+              </a:schemeClr>
+            </a:duotone>
+            <a:extLst/>
+          </a:blip>
+          <a:stretch/>
+        </a:blipFill>
+        <a:effectLst/>
+      </p:bgPr>
+    </p:bg>
+    <p:spTree>
+      <p:nvGrpSpPr>
+        <p:cNvPr id="1" name=""/>
+        <p:cNvGrpSpPr/>
+        <p:nvPr/>
+      </p:nvGrpSpPr>
+      <p:grpSpPr>
+        <a:xfrm>
+          <a:off x="0" y="0"/>
+          <a:ext cx="0" cy="0"/>
+          <a:chOff x="0" y="0"/>
+          <a:chExt cx="0" cy="0"/>
+        </a:xfrm>
+      </p:grpSpPr>
+      <p:sp useBgFill="1">
+        <p:nvSpPr>
+          <p:cNvPr id="8" name="Rectangle 7">
+            <a:extLst>
+              <a:ext uri="{FF2B5EF4-FFF2-40B4-BE49-F238E27FC236}">
+                <a16:creationId xmlns:a16="http://schemas.microsoft.com/office/drawing/2014/main" id="{C8643778-7F6C-4E8D-84D1-D5CDB9928191}"/>
+              </a:ext>
+              <a:ext uri="{C183D7F6-B498-43B3-948B-1728B52AA6E4}">
+                <adec:decorative xmlns:adec="http://schemas.microsoft.com/office/drawing/2017/decorative" val="1"/>
+              </a:ext>
+            </a:extLst>
+          </p:cNvPr>
+          <p:cNvSpPr>
+            <a:spLocks noGrp="1" noRot="1" noChangeAspect="1" noMove="1" noResize="1" noEditPoints="1" noAdjustHandles="1" noChangeArrowheads="1" noChangeShapeType="1" noTextEdit="1"/>
+          </p:cNvSpPr>
+          <p:nvPr>
+            <p:extLst>
+              <p:ext uri="{386F3935-93C4-4BCD-93E2-E3B085C9AB24}">
+                <p16:designElem xmlns:p16="http://schemas.microsoft.com/office/powerpoint/2015/main" val="1"/>
+              </p:ext>
+            </p:extLst>
+          </p:nvPr>
+        </p:nvSpPr>
+        <p:spPr>
+          <a:xfrm>
+            <a:off x="0" y="0"/>
+            <a:ext cx="12192000" cy="6858000"/>
+          </a:xfrm>
+          <a:prstGeom prst="rect">
+            <a:avLst/>
+          </a:prstGeom>
+          <a:ln>
+            <a:noFill/>
+          </a:ln>
+        </p:spPr>
+        <p:style>
+          <a:lnRef idx="2">
+            <a:schemeClr val="accent1">
+              <a:shade val="50000"/>
+            </a:schemeClr>
+          </a:lnRef>
+          <a:fillRef idx="1">
+            <a:schemeClr val="accent1"/>
+          </a:fillRef>
+          <a:effectRef idx="0">
+            <a:schemeClr val="accent1"/>
+          </a:effectRef>
+          <a:fontRef idx="minor">
+            <a:schemeClr val="lt1"/>
+          </a:fontRef>
+        </p:style>
+        <p:txBody>
+          <a:bodyPr rtlCol="0" anchor="ctr"/>
+          <a:lstStyle/>
+          <a:p>
+            <a:pPr algn="ctr"/>
+            <a:endParaRPr lang="en-US"/>
+          </a:p>
+        </p:txBody>
+      </p:sp>
+      <p:sp>
+        <p:nvSpPr>
+          <p:cNvPr id="10" name="Freeform: Shape 9">
+            <a:extLst>
+              <a:ext uri="{FF2B5EF4-FFF2-40B4-BE49-F238E27FC236}">
+                <a16:creationId xmlns:a16="http://schemas.microsoft.com/office/drawing/2014/main" id="{1D22F88D-6907-48AF-B024-346E855E0D96}"/>
+              </a:ext>
+              <a:ext uri="{C183D7F6-B498-43B3-948B-1728B52AA6E4}">
+                <adec:decorative xmlns:adec="http://schemas.microsoft.com/office/drawing/2017/decorative" val="1"/>
+              </a:ext>
+            </a:extLst>
+          </p:cNvPr>
+          <p:cNvSpPr>
+            <a:spLocks noGrp="1" noRot="1" noChangeAspect="1" noMove="1" noResize="1" noEditPoints="1" noAdjustHandles="1" noChangeArrowheads="1" noChangeShapeType="1" noTextEdit="1"/>
+          </p:cNvSpPr>
+          <p:nvPr>
+            <p:extLst>
+              <p:ext uri="{386F3935-93C4-4BCD-93E2-E3B085C9AB24}">
+                <p16:designElem xmlns:p16="http://schemas.microsoft.com/office/powerpoint/2015/main" val="1"/>
+              </p:ext>
+            </p:extLst>
+          </p:nvPr>
+        </p:nvSpPr>
+        <p:spPr>
+          <a:xfrm flipV="1">
+            <a:off x="-1" y="-1"/>
+            <a:ext cx="4403709" cy="6858001"/>
+          </a:xfrm>
+          <a:custGeom>
+            <a:avLst/>
+            <a:gdLst>
+              <a:gd name="connsiteX0" fmla="*/ 3223890 w 4403709"/>
+              <a:gd name="connsiteY0" fmla="*/ 6858001 h 6858001"/>
+              <a:gd name="connsiteX1" fmla="*/ 4101908 w 4403709"/>
+              <a:gd name="connsiteY1" fmla="*/ 6858001 h 6858001"/>
+              <a:gd name="connsiteX2" fmla="*/ 3254950 w 4403709"/>
+              <a:gd name="connsiteY2" fmla="*/ 1599356 h 6858001"/>
+              <a:gd name="connsiteX3" fmla="*/ 3254950 w 4403709"/>
+              <a:gd name="connsiteY3" fmla="*/ 1594062 h 6858001"/>
+              <a:gd name="connsiteX4" fmla="*/ 4403709 w 4403709"/>
+              <a:gd name="connsiteY4" fmla="*/ 0 h 6858001"/>
+              <a:gd name="connsiteX5" fmla="*/ 3254950 w 4403709"/>
+              <a:gd name="connsiteY5" fmla="*/ 0 h 6858001"/>
+              <a:gd name="connsiteX6" fmla="*/ 2903520 w 4403709"/>
+              <a:gd name="connsiteY6" fmla="*/ 0 h 6858001"/>
+              <a:gd name="connsiteX7" fmla="*/ 0 w 4403709"/>
+              <a:gd name="connsiteY7" fmla="*/ 0 h 6858001"/>
+              <a:gd name="connsiteX8" fmla="*/ 0 w 4403709"/>
+              <a:gd name="connsiteY8" fmla="*/ 6858000 h 6858001"/>
+              <a:gd name="connsiteX9" fmla="*/ 3223890 w 4403709"/>
+              <a:gd name="connsiteY9" fmla="*/ 6858000 h 6858001"/>
+            </a:gdLst>
+            <a:ahLst/>
+            <a:cxnLst>
+              <a:cxn ang="0">
+                <a:pos x="connsiteX0" y="connsiteY0"/>
+              </a:cxn>
+              <a:cxn ang="0">
+                <a:pos x="connsiteX1" y="connsiteY1"/>
+              </a:cxn>
+              <a:cxn ang="0">
+                <a:pos x="connsiteX2" y="connsiteY2"/>
+              </a:cxn>
+              <a:cxn ang="0">
+                <a:pos x="connsiteX3" y="connsiteY3"/>
+              </a:cxn>
+              <a:cxn ang="0">
+                <a:pos x="connsiteX4" y="connsiteY4"/>
+              </a:cxn>
+              <a:cxn ang="0">
+                <a:pos x="connsiteX5" y="connsiteY5"/>
+              </a:cxn>
+              <a:cxn ang="0">
+                <a:pos x="connsiteX6" y="connsiteY6"/>
+              </a:cxn>
+              <a:cxn ang="0">
+                <a:pos x="connsiteX7" y="connsiteY7"/>
+              </a:cxn>
+              <a:cxn ang="0">
+                <a:pos x="connsiteX8" y="connsiteY8"/>
+              </a:cxn>
+              <a:cxn ang="0">
+                <a:pos x="connsiteX9" y="connsiteY9"/>
+              </a:cxn>
+            </a:cxnLst>
+            <a:rect l="l" t="t" r="r" b="b"/>
+            <a:pathLst>
+              <a:path w="4403709" h="6858001">
+                <a:moveTo>
+                  <a:pt x="3223890" y="6858001"/>
+                </a:moveTo>
+                <a:lnTo>
+                  <a:pt x="4101908" y="6858001"/>
+                </a:lnTo>
+                <a:lnTo>
+                  <a:pt x="3254950" y="1599356"/>
+                </a:lnTo>
+                <a:lnTo>
+                  <a:pt x="3254950" y="1594062"/>
+                </a:lnTo>
+                <a:lnTo>
+                  <a:pt x="4403709" y="0"/>
+                </a:lnTo>
+                <a:lnTo>
+                  <a:pt x="3254950" y="0"/>
+                </a:lnTo>
+                <a:lnTo>
+                  <a:pt x="2903520" y="0"/>
+                </a:lnTo>
+                <a:lnTo>
+                  <a:pt x="0" y="0"/>
+                </a:lnTo>
+                <a:lnTo>
+                  <a:pt x="0" y="6858000"/>
+                </a:lnTo>
+                <a:lnTo>
+                  <a:pt x="3223890" y="6858000"/>
+                </a:lnTo>
+                <a:close/>
+              </a:path>
+            </a:pathLst>
+          </a:custGeom>
+          <a:gradFill flip="none" rotWithShape="1">
+            <a:gsLst>
+              <a:gs pos="0">
+                <a:schemeClr val="accent1">
+                  <a:lumMod val="89000"/>
+                </a:schemeClr>
+              </a:gs>
+              <a:gs pos="23000">
+                <a:schemeClr val="accent1">
+                  <a:lumMod val="89000"/>
+                </a:schemeClr>
+              </a:gs>
+              <a:gs pos="69000">
+                <a:schemeClr val="accent1">
+                  <a:lumMod val="75000"/>
+                </a:schemeClr>
+              </a:gs>
+              <a:gs pos="97000">
+                <a:schemeClr val="accent1">
+                  <a:lumMod val="70000"/>
+                </a:schemeClr>
+              </a:gs>
+            </a:gsLst>
+            <a:path path="circle">
+              <a:fillToRect l="50000" t="50000" r="50000" b="50000"/>
+            </a:path>
+            <a:tileRect/>
+          </a:gradFill>
+          <a:ln>
+            <a:noFill/>
+          </a:ln>
+        </p:spPr>
+        <p:style>
+          <a:lnRef idx="2">
+            <a:schemeClr val="accent1">
+              <a:shade val="50000"/>
+            </a:schemeClr>
+          </a:lnRef>
+          <a:fillRef idx="1002">
+            <a:schemeClr val="dk1"/>
+          </a:fillRef>
+          <a:effectRef idx="0">
+            <a:schemeClr val="accent1"/>
+          </a:effectRef>
+          <a:fontRef idx="minor">
+            <a:schemeClr val="lt1"/>
+          </a:fontRef>
+        </p:style>
+        <p:txBody>
+          <a:bodyPr rtlCol="0" anchor="ctr"/>
+          <a:lstStyle/>
+          <a:p>
+            <a:pPr algn="ctr"/>
+            <a:endParaRPr lang="en-US">
+              <a:solidFill>
+                <a:schemeClr val="tx1"/>
+              </a:solidFill>
+            </a:endParaRPr>
+          </a:p>
+        </p:txBody>
+      </p:sp>
+      <p:sp>
+        <p:nvSpPr>
+          <p:cNvPr id="2" name="Title 1">
+            <a:extLst>
+              <a:ext uri="{FF2B5EF4-FFF2-40B4-BE49-F238E27FC236}">
+                <a16:creationId xmlns:a16="http://schemas.microsoft.com/office/drawing/2014/main" id="{B6A05BC4-FE98-4132-B81B-8258CC984EFD}"/>
+              </a:ext>
+            </a:extLst>
+          </p:cNvPr>
+          <p:cNvSpPr>
+            <a:spLocks noGrp="1"/>
+          </p:cNvSpPr>
+          <p:nvPr>
+            <p:ph type="title"/>
+          </p:nvPr>
+        </p:nvSpPr>
+        <p:spPr>
+          <a:xfrm>
+            <a:off x="496112" y="685801"/>
+            <a:ext cx="2743200" cy="5105400"/>
+          </a:xfrm>
+        </p:spPr>
+        <p:txBody>
+          <a:bodyPr>
+            <a:normAutofit/>
+          </a:bodyPr>
+          <a:lstStyle/>
+          <a:p>
+            <a:pPr algn="l"/>
+            <a:r>
+              <a:rPr lang="en-US" sz="3200" dirty="0">
+                <a:solidFill>
+                  <a:srgbClr val="FFFFFF"/>
+                </a:solidFill>
+              </a:rPr>
+              <a:t>Demo</a:t>
+            </a:r>
+          </a:p>
+        </p:txBody>
+      </p:sp>
+      <p:grpSp>
+        <p:nvGrpSpPr>
+          <p:cNvPr id="12" name="Group 11">
+            <a:extLst>
+              <a:ext uri="{FF2B5EF4-FFF2-40B4-BE49-F238E27FC236}">
+                <a16:creationId xmlns:a16="http://schemas.microsoft.com/office/drawing/2014/main" id="{F3842748-48B5-4DD0-A06A-A31C74024A99}"/>
+              </a:ext>
+              <a:ext uri="{C183D7F6-B498-43B3-948B-1728B52AA6E4}">
+                <adec:decorative xmlns:adec="http://schemas.microsoft.com/office/drawing/2017/decorative" val="1"/>
+              </a:ext>
+            </a:extLst>
+          </p:cNvPr>
+          <p:cNvGrpSpPr>
+            <a:grpSpLocks noGrp="1" noUngrp="1" noRot="1" noChangeAspect="1" noMove="1" noResize="1"/>
+          </p:cNvGrpSpPr>
+          <p:nvPr>
+            <p:extLst>
+              <p:ext uri="{386F3935-93C4-4BCD-93E2-E3B085C9AB24}">
+                <p16:designElem xmlns:p16="http://schemas.microsoft.com/office/powerpoint/2015/main" val="1"/>
+              </p:ext>
+            </p:extLst>
+          </p:nvPr>
+        </p:nvGrpSpPr>
+        <p:grpSpPr>
+          <a:xfrm>
+            <a:off x="3315292" y="0"/>
+            <a:ext cx="2436813" cy="6858001"/>
+            <a:chOff x="1320800" y="0"/>
+            <a:chExt cx="2436813" cy="6858001"/>
+          </a:xfrm>
+        </p:grpSpPr>
+        <p:sp>
+          <p:nvSpPr>
+            <p:cNvPr id="13" name="Freeform 6">
+              <a:extLst>
+                <a:ext uri="{FF2B5EF4-FFF2-40B4-BE49-F238E27FC236}">
+                  <a16:creationId xmlns:a16="http://schemas.microsoft.com/office/drawing/2014/main" id="{548E99BE-1071-4690-9B9C-07926CEE5557}"/>
+                </a:ext>
+                <a:ext uri="{C183D7F6-B498-43B3-948B-1728B52AA6E4}">
+                  <adec:decorative xmlns:adec="http://schemas.microsoft.com/office/drawing/2017/decorative" val="1"/>
+                </a:ext>
+              </a:extLst>
+            </p:cNvPr>
+            <p:cNvSpPr/>
+            <p:nvPr>
+              <p:extLst>
+                <p:ext uri="{386F3935-93C4-4BCD-93E2-E3B085C9AB24}">
+                  <p16:designElem xmlns:p16="http://schemas.microsoft.com/office/powerpoint/2015/main" val="1"/>
+                </p:ext>
+              </p:extLst>
+            </p:nvPr>
+          </p:nvSpPr>
+          <p:spPr bwMode="auto">
+            <a:xfrm>
+              <a:off x="1627188" y="0"/>
+              <a:ext cx="1122363" cy="5329238"/>
+            </a:xfrm>
+            <a:custGeom>
+              <a:avLst/>
+              <a:gdLst/>
+              <a:ahLst/>
+              <a:cxnLst/>
+              <a:rect l="0" t="0" r="r" b="b"/>
+              <a:pathLst>
+                <a:path w="707" h="3357">
+                  <a:moveTo>
+                    <a:pt x="0" y="3330"/>
+                  </a:moveTo>
+                  <a:lnTo>
+                    <a:pt x="156" y="3357"/>
+                  </a:lnTo>
+                  <a:lnTo>
+                    <a:pt x="707" y="0"/>
+                  </a:lnTo>
+                  <a:lnTo>
+                    <a:pt x="547" y="0"/>
+                  </a:lnTo>
+                  <a:lnTo>
+                    <a:pt x="0" y="3330"/>
+                  </a:lnTo>
+                  <a:close/>
+                </a:path>
+              </a:pathLst>
+            </a:custGeom>
+            <a:solidFill>
+              <a:schemeClr val="accent1"/>
+            </a:solidFill>
+            <a:ln>
+              <a:noFill/>
+            </a:ln>
+          </p:spPr>
+        </p:sp>
+        <p:sp>
+          <p:nvSpPr>
+            <p:cNvPr id="14" name="Freeform 7">
+              <a:extLst>
+                <a:ext uri="{FF2B5EF4-FFF2-40B4-BE49-F238E27FC236}">
+                  <a16:creationId xmlns:a16="http://schemas.microsoft.com/office/drawing/2014/main" id="{9301F039-B467-413A-B25C-770E51069D42}"/>
+                </a:ext>
+                <a:ext uri="{C183D7F6-B498-43B3-948B-1728B52AA6E4}">
+                  <adec:decorative xmlns:adec="http://schemas.microsoft.com/office/drawing/2017/decorative" val="1"/>
+                </a:ext>
+              </a:extLst>
+            </p:cNvPr>
+            <p:cNvSpPr/>
+            <p:nvPr>
+              <p:extLst>
+                <p:ext uri="{386F3935-93C4-4BCD-93E2-E3B085C9AB24}">
+                  <p16:designElem xmlns:p16="http://schemas.microsoft.com/office/powerpoint/2015/main" val="1"/>
+                </p:ext>
+              </p:extLst>
+            </p:nvPr>
+          </p:nvSpPr>
+          <p:spPr bwMode="auto">
+            <a:xfrm>
+              <a:off x="1320800" y="0"/>
+              <a:ext cx="1117600" cy="5276850"/>
+            </a:xfrm>
+            <a:custGeom>
+              <a:avLst/>
+              <a:gdLst/>
+              <a:ahLst/>
+              <a:cxnLst/>
+              <a:rect l="0" t="0" r="r" b="b"/>
+              <a:pathLst>
+                <a:path w="704" h="3324">
+                  <a:moveTo>
+                    <a:pt x="704" y="0"/>
+                  </a:moveTo>
+                  <a:lnTo>
+                    <a:pt x="545" y="0"/>
+                  </a:lnTo>
+                  <a:lnTo>
+                    <a:pt x="0" y="3300"/>
+                  </a:lnTo>
+                  <a:lnTo>
+                    <a:pt x="157" y="3324"/>
+                  </a:lnTo>
+                  <a:lnTo>
+                    <a:pt x="704" y="0"/>
+                  </a:lnTo>
+                  <a:close/>
+                </a:path>
+              </a:pathLst>
+            </a:custGeom>
+            <a:solidFill>
+              <a:schemeClr val="tx1">
+                <a:lumMod val="65000"/>
+                <a:lumOff val="35000"/>
+              </a:schemeClr>
+            </a:solidFill>
+            <a:ln>
+              <a:noFill/>
+            </a:ln>
+          </p:spPr>
+        </p:sp>
+        <p:sp>
+          <p:nvSpPr>
+            <p:cNvPr id="15" name="Freeform 8">
+              <a:extLst>
+                <a:ext uri="{FF2B5EF4-FFF2-40B4-BE49-F238E27FC236}">
+                  <a16:creationId xmlns:a16="http://schemas.microsoft.com/office/drawing/2014/main" id="{9F06AEC1-5558-49E8-8CAC-FEBD00DF0031}"/>
+                </a:ext>
+                <a:ext uri="{C183D7F6-B498-43B3-948B-1728B52AA6E4}">
+                  <adec:decorative xmlns:adec="http://schemas.microsoft.com/office/drawing/2017/decorative" val="1"/>
+                </a:ext>
+              </a:extLst>
+            </p:cNvPr>
+            <p:cNvSpPr/>
+            <p:nvPr>
+              <p:extLst>
+                <p:ext uri="{386F3935-93C4-4BCD-93E2-E3B085C9AB24}">
+                  <p16:designElem xmlns:p16="http://schemas.microsoft.com/office/powerpoint/2015/main" val="1"/>
+                </p:ext>
+              </p:extLst>
+            </p:nvPr>
+          </p:nvSpPr>
+          <p:spPr bwMode="auto">
+            <a:xfrm>
+              <a:off x="1320800" y="5238750"/>
+              <a:ext cx="1228725" cy="1619250"/>
+            </a:xfrm>
+            <a:custGeom>
+              <a:avLst/>
+              <a:gdLst/>
+              <a:ahLst/>
+              <a:cxnLst/>
+              <a:rect l="0" t="0" r="r" b="b"/>
+              <a:pathLst>
+                <a:path w="774" h="1020">
+                  <a:moveTo>
+                    <a:pt x="0" y="0"/>
+                  </a:moveTo>
+                  <a:lnTo>
+                    <a:pt x="740" y="1020"/>
+                  </a:lnTo>
+                  <a:lnTo>
+                    <a:pt x="774" y="1020"/>
+                  </a:lnTo>
+                  <a:lnTo>
+                    <a:pt x="0" y="0"/>
+                  </a:lnTo>
+                  <a:close/>
+                </a:path>
+              </a:pathLst>
+            </a:custGeom>
+            <a:solidFill>
+              <a:schemeClr val="tx1">
+                <a:lumMod val="85000"/>
+                <a:lumOff val="15000"/>
+              </a:schemeClr>
+            </a:solidFill>
+            <a:ln>
+              <a:noFill/>
+            </a:ln>
+          </p:spPr>
+        </p:sp>
+        <p:sp>
+          <p:nvSpPr>
+            <p:cNvPr id="16" name="Freeform 9">
+              <a:extLst>
+                <a:ext uri="{FF2B5EF4-FFF2-40B4-BE49-F238E27FC236}">
+                  <a16:creationId xmlns:a16="http://schemas.microsoft.com/office/drawing/2014/main" id="{D10B76B9-BA68-471E-B58C-ED91198A9FAB}"/>
+                </a:ext>
+                <a:ext uri="{C183D7F6-B498-43B3-948B-1728B52AA6E4}">
+                  <adec:decorative xmlns:adec="http://schemas.microsoft.com/office/drawing/2017/decorative" val="1"/>
+                </a:ext>
+              </a:extLst>
+            </p:cNvPr>
+            <p:cNvSpPr/>
+            <p:nvPr>
+              <p:extLst>
+                <p:ext uri="{386F3935-93C4-4BCD-93E2-E3B085C9AB24}">
+                  <p16:designElem xmlns:p16="http://schemas.microsoft.com/office/powerpoint/2015/main" val="1"/>
+                </p:ext>
+              </p:extLst>
+            </p:nvPr>
+          </p:nvSpPr>
+          <p:spPr bwMode="auto">
+            <a:xfrm>
+              <a:off x="1627188" y="5291138"/>
+              <a:ext cx="1495425" cy="1566863"/>
+            </a:xfrm>
+            <a:custGeom>
+              <a:avLst/>
+              <a:gdLst/>
+              <a:ahLst/>
+              <a:cxnLst/>
+              <a:rect l="0" t="0" r="r" b="b"/>
+              <a:pathLst>
+                <a:path w="942" h="987">
+                  <a:moveTo>
+                    <a:pt x="0" y="0"/>
+                  </a:moveTo>
+                  <a:lnTo>
+                    <a:pt x="909" y="987"/>
+                  </a:lnTo>
+                  <a:lnTo>
+                    <a:pt x="942" y="987"/>
+                  </a:lnTo>
+                  <a:lnTo>
+                    <a:pt x="0" y="0"/>
+                  </a:lnTo>
+                  <a:close/>
+                </a:path>
+              </a:pathLst>
+            </a:custGeom>
+            <a:solidFill>
+              <a:schemeClr val="accent1">
+                <a:lumMod val="50000"/>
+              </a:schemeClr>
+            </a:solidFill>
+            <a:ln>
+              <a:noFill/>
+            </a:ln>
+          </p:spPr>
+        </p:sp>
+        <p:sp>
+          <p:nvSpPr>
+            <p:cNvPr id="17" name="Freeform 10">
+              <a:extLst>
+                <a:ext uri="{FF2B5EF4-FFF2-40B4-BE49-F238E27FC236}">
+                  <a16:creationId xmlns:a16="http://schemas.microsoft.com/office/drawing/2014/main" id="{FEB3913B-54A3-490E-BA4B-5D0330990FCB}"/>
+                </a:ext>
+                <a:ext uri="{C183D7F6-B498-43B3-948B-1728B52AA6E4}">
+                  <adec:decorative xmlns:adec="http://schemas.microsoft.com/office/drawing/2017/decorative" val="1"/>
+                </a:ext>
+              </a:extLst>
+            </p:cNvPr>
+            <p:cNvSpPr/>
+            <p:nvPr>
+              <p:extLst>
+                <p:ext uri="{386F3935-93C4-4BCD-93E2-E3B085C9AB24}">
+                  <p16:designElem xmlns:p16="http://schemas.microsoft.com/office/powerpoint/2015/main" val="1"/>
+                </p:ext>
+              </p:extLst>
+            </p:nvPr>
+          </p:nvSpPr>
+          <p:spPr bwMode="auto">
+            <a:xfrm>
+              <a:off x="1627188" y="5286375"/>
+              <a:ext cx="2130425" cy="1571625"/>
+            </a:xfrm>
+            <a:custGeom>
+              <a:avLst/>
+              <a:gdLst/>
+              <a:ahLst/>
+              <a:cxnLst/>
+              <a:rect l="0" t="0" r="r" b="b"/>
+              <a:pathLst>
+                <a:path w="1342" h="990">
+                  <a:moveTo>
+                    <a:pt x="0" y="3"/>
+                  </a:moveTo>
+                  <a:lnTo>
+                    <a:pt x="942" y="990"/>
+                  </a:lnTo>
+                  <a:lnTo>
+                    <a:pt x="1342" y="990"/>
+                  </a:lnTo>
+                  <a:lnTo>
+                    <a:pt x="156" y="27"/>
+                  </a:lnTo>
+                  <a:lnTo>
+                    <a:pt x="0" y="0"/>
+                  </a:lnTo>
+                  <a:lnTo>
+                    <a:pt x="0" y="3"/>
+                  </a:lnTo>
+                  <a:close/>
+                </a:path>
+              </a:pathLst>
+            </a:custGeom>
+            <a:solidFill>
+              <a:schemeClr val="accent1">
+                <a:lumMod val="75000"/>
+              </a:schemeClr>
+            </a:solidFill>
+            <a:ln>
+              <a:noFill/>
+            </a:ln>
+          </p:spPr>
+        </p:sp>
+        <p:sp>
+          <p:nvSpPr>
+            <p:cNvPr id="18" name="Freeform 11">
+              <a:extLst>
+                <a:ext uri="{FF2B5EF4-FFF2-40B4-BE49-F238E27FC236}">
+                  <a16:creationId xmlns:a16="http://schemas.microsoft.com/office/drawing/2014/main" id="{F75DC961-08A4-46F8-8A80-2E1FB977E1F4}"/>
+                </a:ext>
+                <a:ext uri="{C183D7F6-B498-43B3-948B-1728B52AA6E4}">
+                  <adec:decorative xmlns:adec="http://schemas.microsoft.com/office/drawing/2017/decorative" val="1"/>
+                </a:ext>
+              </a:extLst>
+            </p:cNvPr>
+            <p:cNvSpPr/>
+            <p:nvPr>
+              <p:extLst>
+                <p:ext uri="{386F3935-93C4-4BCD-93E2-E3B085C9AB24}">
+                  <p16:designElem xmlns:p16="http://schemas.microsoft.com/office/powerpoint/2015/main" val="1"/>
+                </p:ext>
+              </p:extLst>
+            </p:nvPr>
+          </p:nvSpPr>
+          <p:spPr bwMode="auto">
+            <a:xfrm>
+              <a:off x="1320800" y="5238750"/>
+              <a:ext cx="1695450" cy="1619250"/>
+            </a:xfrm>
+            <a:custGeom>
+              <a:avLst/>
+              <a:gdLst/>
+              <a:ahLst/>
+              <a:cxnLst/>
+              <a:rect l="0" t="0" r="r" b="b"/>
+              <a:pathLst>
+                <a:path w="1068" h="1020">
+                  <a:moveTo>
+                    <a:pt x="1068" y="1020"/>
+                  </a:moveTo>
+                  <a:lnTo>
+                    <a:pt x="184" y="60"/>
+                  </a:lnTo>
+                  <a:lnTo>
+                    <a:pt x="154" y="27"/>
+                  </a:lnTo>
+                  <a:lnTo>
+                    <a:pt x="157" y="27"/>
+                  </a:lnTo>
+                  <a:lnTo>
+                    <a:pt x="157" y="24"/>
+                  </a:lnTo>
+                  <a:lnTo>
+                    <a:pt x="154" y="24"/>
+                  </a:lnTo>
+                  <a:lnTo>
+                    <a:pt x="0" y="0"/>
+                  </a:lnTo>
+                  <a:lnTo>
+                    <a:pt x="0" y="0"/>
+                  </a:lnTo>
+                  <a:lnTo>
+                    <a:pt x="774" y="1020"/>
+                  </a:lnTo>
+                  <a:lnTo>
+                    <a:pt x="1068" y="1020"/>
+                  </a:lnTo>
+                  <a:close/>
+                </a:path>
+              </a:pathLst>
+            </a:custGeom>
+            <a:solidFill>
+              <a:schemeClr val="tx1">
+                <a:lumMod val="75000"/>
+                <a:lumOff val="25000"/>
+              </a:schemeClr>
+            </a:solidFill>
+            <a:ln>
+              <a:noFill/>
+            </a:ln>
+          </p:spPr>
+        </p:sp>
+      </p:grpSp>
+      <p:pic>
+        <p:nvPicPr>
+          <p:cNvPr id="4" name="Online Media 3" title="MineCart Demo">
+            <a:hlinkClick r:id="" action="ppaction://media"/>
+            <a:extLst>
+              <a:ext uri="{FF2B5EF4-FFF2-40B4-BE49-F238E27FC236}">
+                <a16:creationId xmlns:a16="http://schemas.microsoft.com/office/drawing/2014/main" id="{92753453-0EB1-4A08-A03B-5238A8D8341F}"/>
+              </a:ext>
+            </a:extLst>
+          </p:cNvPr>
+          <p:cNvPicPr>
+            <a:picLocks noGrp="1" noRot="1" noChangeAspect="1"/>
+          </p:cNvPicPr>
+          <p:nvPr>
+            <p:ph idx="1"/>
+            <a:videoFile r:link="rId1"/>
+          </p:nvPr>
+        </p:nvPicPr>
+        <p:blipFill>
+          <a:blip r:embed="rId4"/>
+          <a:stretch>
+            <a:fillRect/>
+          </a:stretch>
+        </p:blipFill>
+        <p:spPr>
+          <a:xfrm>
+            <a:off x="4703263" y="1265382"/>
+            <a:ext cx="7309300" cy="4111481"/>
+          </a:xfrm>
+          <a:prstGeom prst="rect">
+            <a:avLst/>
+          </a:prstGeom>
+          <a:ln>
+            <a:solidFill>
+              <a:schemeClr val="accent1"/>
+            </a:solidFill>
+          </a:ln>
+        </p:spPr>
+      </p:pic>
+    </p:spTree>
+    <p:extLst>
+      <p:ext uri="{BB962C8B-B14F-4D97-AF65-F5344CB8AC3E}">
+        <p14:creationId xmlns:p14="http://schemas.microsoft.com/office/powerpoint/2010/main" val="59944253"/>
+      </p:ext>
+    </p:extLst>
+  </p:cSld>
+  <p:clrMapOvr>
+    <a:masterClrMapping/>
+  </p:clrMapOvr>
+</p:sld>
+</file>
+
+<file path=ppt/slides/slide4.xml><?xml version="1.0" encoding="utf-8"?>
+<p:sld xmlns:a="http://schemas.openxmlformats.org/drawingml/2006/main" xmlns:r="http://schemas.openxmlformats.org/officeDocument/2006/relationships" xmlns:p="http://schemas.openxmlformats.org/presentationml/2006/main">
+  <p:cSld>
+    <p:bg>
+      <p:bgPr>
+        <a:blipFill rotWithShape="1">
           <a:blip r:embed="rId2">
             <a:duotone>
               <a:schemeClr val="bg2">
@@ -9236,7 +10034,7 @@
 </p:sld>
 </file>
 
-<file path=ppt/slides/slide4.xml><?xml version="1.0" encoding="utf-8"?>
+<file path=ppt/slides/slide5.xml><?xml version="1.0" encoding="utf-8"?>
 <p:sld xmlns:a="http://schemas.openxmlformats.org/drawingml/2006/main" xmlns:r="http://schemas.openxmlformats.org/officeDocument/2006/relationships" xmlns:p="http://schemas.openxmlformats.org/presentationml/2006/main">
   <p:cSld>
     <p:bg>
@@ -10107,7 +10905,7 @@
 </p:sld>
 </file>
 
-<file path=ppt/slides/slide5.xml><?xml version="1.0" encoding="utf-8"?>
+<file path=ppt/slides/slide6.xml><?xml version="1.0" encoding="utf-8"?>
 <p:sld xmlns:a="http://schemas.openxmlformats.org/drawingml/2006/main" xmlns:r="http://schemas.openxmlformats.org/officeDocument/2006/relationships" xmlns:p="http://schemas.openxmlformats.org/presentationml/2006/main">
   <p:cSld>
     <p:bg>

</xml_diff>

<commit_message>
move demo video slide down
</commit_message>
<xml_diff>
--- a/Research/Pitch Draft 4.pptx
+++ b/Research/Pitch Draft 4.pptx
@@ -7,8 +7,8 @@
   <p:sldIdLst>
     <p:sldId id="256" r:id="rId2"/>
     <p:sldId id="257" r:id="rId3"/>
-    <p:sldId id="263" r:id="rId4"/>
-    <p:sldId id="258" r:id="rId5"/>
+    <p:sldId id="258" r:id="rId4"/>
+    <p:sldId id="263" r:id="rId5"/>
     <p:sldId id="261" r:id="rId6"/>
     <p:sldId id="262" r:id="rId7"/>
   </p:sldIdLst>
@@ -7977,803 +7977,6 @@
     <p:bg>
       <p:bgPr>
         <a:blipFill rotWithShape="1">
-          <a:blip r:embed="rId3">
-            <a:duotone>
-              <a:schemeClr val="bg2">
-                <a:shade val="76000"/>
-                <a:satMod val="180000"/>
-              </a:schemeClr>
-              <a:schemeClr val="bg2">
-                <a:tint val="80000"/>
-                <a:satMod val="120000"/>
-                <a:lumMod val="180000"/>
-              </a:schemeClr>
-            </a:duotone>
-            <a:extLst/>
-          </a:blip>
-          <a:stretch/>
-        </a:blipFill>
-        <a:effectLst/>
-      </p:bgPr>
-    </p:bg>
-    <p:spTree>
-      <p:nvGrpSpPr>
-        <p:cNvPr id="1" name=""/>
-        <p:cNvGrpSpPr/>
-        <p:nvPr/>
-      </p:nvGrpSpPr>
-      <p:grpSpPr>
-        <a:xfrm>
-          <a:off x="0" y="0"/>
-          <a:ext cx="0" cy="0"/>
-          <a:chOff x="0" y="0"/>
-          <a:chExt cx="0" cy="0"/>
-        </a:xfrm>
-      </p:grpSpPr>
-      <p:sp useBgFill="1">
-        <p:nvSpPr>
-          <p:cNvPr id="8" name="Rectangle 7">
-            <a:extLst>
-              <a:ext uri="{FF2B5EF4-FFF2-40B4-BE49-F238E27FC236}">
-                <a16:creationId xmlns:a16="http://schemas.microsoft.com/office/drawing/2014/main" id="{C8643778-7F6C-4E8D-84D1-D5CDB9928191}"/>
-              </a:ext>
-              <a:ext uri="{C183D7F6-B498-43B3-948B-1728B52AA6E4}">
-                <adec:decorative xmlns:adec="http://schemas.microsoft.com/office/drawing/2017/decorative" val="1"/>
-              </a:ext>
-            </a:extLst>
-          </p:cNvPr>
-          <p:cNvSpPr>
-            <a:spLocks noGrp="1" noRot="1" noChangeAspect="1" noMove="1" noResize="1" noEditPoints="1" noAdjustHandles="1" noChangeArrowheads="1" noChangeShapeType="1" noTextEdit="1"/>
-          </p:cNvSpPr>
-          <p:nvPr>
-            <p:extLst>
-              <p:ext uri="{386F3935-93C4-4BCD-93E2-E3B085C9AB24}">
-                <p16:designElem xmlns:p16="http://schemas.microsoft.com/office/powerpoint/2015/main" val="1"/>
-              </p:ext>
-            </p:extLst>
-          </p:nvPr>
-        </p:nvSpPr>
-        <p:spPr>
-          <a:xfrm>
-            <a:off x="0" y="0"/>
-            <a:ext cx="12192000" cy="6858000"/>
-          </a:xfrm>
-          <a:prstGeom prst="rect">
-            <a:avLst/>
-          </a:prstGeom>
-          <a:ln>
-            <a:noFill/>
-          </a:ln>
-        </p:spPr>
-        <p:style>
-          <a:lnRef idx="2">
-            <a:schemeClr val="accent1">
-              <a:shade val="50000"/>
-            </a:schemeClr>
-          </a:lnRef>
-          <a:fillRef idx="1">
-            <a:schemeClr val="accent1"/>
-          </a:fillRef>
-          <a:effectRef idx="0">
-            <a:schemeClr val="accent1"/>
-          </a:effectRef>
-          <a:fontRef idx="minor">
-            <a:schemeClr val="lt1"/>
-          </a:fontRef>
-        </p:style>
-        <p:txBody>
-          <a:bodyPr rtlCol="0" anchor="ctr"/>
-          <a:lstStyle/>
-          <a:p>
-            <a:pPr algn="ctr"/>
-            <a:endParaRPr lang="en-US"/>
-          </a:p>
-        </p:txBody>
-      </p:sp>
-      <p:sp>
-        <p:nvSpPr>
-          <p:cNvPr id="10" name="Freeform: Shape 9">
-            <a:extLst>
-              <a:ext uri="{FF2B5EF4-FFF2-40B4-BE49-F238E27FC236}">
-                <a16:creationId xmlns:a16="http://schemas.microsoft.com/office/drawing/2014/main" id="{1D22F88D-6907-48AF-B024-346E855E0D96}"/>
-              </a:ext>
-              <a:ext uri="{C183D7F6-B498-43B3-948B-1728B52AA6E4}">
-                <adec:decorative xmlns:adec="http://schemas.microsoft.com/office/drawing/2017/decorative" val="1"/>
-              </a:ext>
-            </a:extLst>
-          </p:cNvPr>
-          <p:cNvSpPr>
-            <a:spLocks noGrp="1" noRot="1" noChangeAspect="1" noMove="1" noResize="1" noEditPoints="1" noAdjustHandles="1" noChangeArrowheads="1" noChangeShapeType="1" noTextEdit="1"/>
-          </p:cNvSpPr>
-          <p:nvPr>
-            <p:extLst>
-              <p:ext uri="{386F3935-93C4-4BCD-93E2-E3B085C9AB24}">
-                <p16:designElem xmlns:p16="http://schemas.microsoft.com/office/powerpoint/2015/main" val="1"/>
-              </p:ext>
-            </p:extLst>
-          </p:nvPr>
-        </p:nvSpPr>
-        <p:spPr>
-          <a:xfrm flipV="1">
-            <a:off x="-1" y="-1"/>
-            <a:ext cx="4403709" cy="6858001"/>
-          </a:xfrm>
-          <a:custGeom>
-            <a:avLst/>
-            <a:gdLst>
-              <a:gd name="connsiteX0" fmla="*/ 3223890 w 4403709"/>
-              <a:gd name="connsiteY0" fmla="*/ 6858001 h 6858001"/>
-              <a:gd name="connsiteX1" fmla="*/ 4101908 w 4403709"/>
-              <a:gd name="connsiteY1" fmla="*/ 6858001 h 6858001"/>
-              <a:gd name="connsiteX2" fmla="*/ 3254950 w 4403709"/>
-              <a:gd name="connsiteY2" fmla="*/ 1599356 h 6858001"/>
-              <a:gd name="connsiteX3" fmla="*/ 3254950 w 4403709"/>
-              <a:gd name="connsiteY3" fmla="*/ 1594062 h 6858001"/>
-              <a:gd name="connsiteX4" fmla="*/ 4403709 w 4403709"/>
-              <a:gd name="connsiteY4" fmla="*/ 0 h 6858001"/>
-              <a:gd name="connsiteX5" fmla="*/ 3254950 w 4403709"/>
-              <a:gd name="connsiteY5" fmla="*/ 0 h 6858001"/>
-              <a:gd name="connsiteX6" fmla="*/ 2903520 w 4403709"/>
-              <a:gd name="connsiteY6" fmla="*/ 0 h 6858001"/>
-              <a:gd name="connsiteX7" fmla="*/ 0 w 4403709"/>
-              <a:gd name="connsiteY7" fmla="*/ 0 h 6858001"/>
-              <a:gd name="connsiteX8" fmla="*/ 0 w 4403709"/>
-              <a:gd name="connsiteY8" fmla="*/ 6858000 h 6858001"/>
-              <a:gd name="connsiteX9" fmla="*/ 3223890 w 4403709"/>
-              <a:gd name="connsiteY9" fmla="*/ 6858000 h 6858001"/>
-            </a:gdLst>
-            <a:ahLst/>
-            <a:cxnLst>
-              <a:cxn ang="0">
-                <a:pos x="connsiteX0" y="connsiteY0"/>
-              </a:cxn>
-              <a:cxn ang="0">
-                <a:pos x="connsiteX1" y="connsiteY1"/>
-              </a:cxn>
-              <a:cxn ang="0">
-                <a:pos x="connsiteX2" y="connsiteY2"/>
-              </a:cxn>
-              <a:cxn ang="0">
-                <a:pos x="connsiteX3" y="connsiteY3"/>
-              </a:cxn>
-              <a:cxn ang="0">
-                <a:pos x="connsiteX4" y="connsiteY4"/>
-              </a:cxn>
-              <a:cxn ang="0">
-                <a:pos x="connsiteX5" y="connsiteY5"/>
-              </a:cxn>
-              <a:cxn ang="0">
-                <a:pos x="connsiteX6" y="connsiteY6"/>
-              </a:cxn>
-              <a:cxn ang="0">
-                <a:pos x="connsiteX7" y="connsiteY7"/>
-              </a:cxn>
-              <a:cxn ang="0">
-                <a:pos x="connsiteX8" y="connsiteY8"/>
-              </a:cxn>
-              <a:cxn ang="0">
-                <a:pos x="connsiteX9" y="connsiteY9"/>
-              </a:cxn>
-            </a:cxnLst>
-            <a:rect l="l" t="t" r="r" b="b"/>
-            <a:pathLst>
-              <a:path w="4403709" h="6858001">
-                <a:moveTo>
-                  <a:pt x="3223890" y="6858001"/>
-                </a:moveTo>
-                <a:lnTo>
-                  <a:pt x="4101908" y="6858001"/>
-                </a:lnTo>
-                <a:lnTo>
-                  <a:pt x="3254950" y="1599356"/>
-                </a:lnTo>
-                <a:lnTo>
-                  <a:pt x="3254950" y="1594062"/>
-                </a:lnTo>
-                <a:lnTo>
-                  <a:pt x="4403709" y="0"/>
-                </a:lnTo>
-                <a:lnTo>
-                  <a:pt x="3254950" y="0"/>
-                </a:lnTo>
-                <a:lnTo>
-                  <a:pt x="2903520" y="0"/>
-                </a:lnTo>
-                <a:lnTo>
-                  <a:pt x="0" y="0"/>
-                </a:lnTo>
-                <a:lnTo>
-                  <a:pt x="0" y="6858000"/>
-                </a:lnTo>
-                <a:lnTo>
-                  <a:pt x="3223890" y="6858000"/>
-                </a:lnTo>
-                <a:close/>
-              </a:path>
-            </a:pathLst>
-          </a:custGeom>
-          <a:gradFill flip="none" rotWithShape="1">
-            <a:gsLst>
-              <a:gs pos="0">
-                <a:schemeClr val="accent1">
-                  <a:lumMod val="89000"/>
-                </a:schemeClr>
-              </a:gs>
-              <a:gs pos="23000">
-                <a:schemeClr val="accent1">
-                  <a:lumMod val="89000"/>
-                </a:schemeClr>
-              </a:gs>
-              <a:gs pos="69000">
-                <a:schemeClr val="accent1">
-                  <a:lumMod val="75000"/>
-                </a:schemeClr>
-              </a:gs>
-              <a:gs pos="97000">
-                <a:schemeClr val="accent1">
-                  <a:lumMod val="70000"/>
-                </a:schemeClr>
-              </a:gs>
-            </a:gsLst>
-            <a:path path="circle">
-              <a:fillToRect l="50000" t="50000" r="50000" b="50000"/>
-            </a:path>
-            <a:tileRect/>
-          </a:gradFill>
-          <a:ln>
-            <a:noFill/>
-          </a:ln>
-        </p:spPr>
-        <p:style>
-          <a:lnRef idx="2">
-            <a:schemeClr val="accent1">
-              <a:shade val="50000"/>
-            </a:schemeClr>
-          </a:lnRef>
-          <a:fillRef idx="1002">
-            <a:schemeClr val="dk1"/>
-          </a:fillRef>
-          <a:effectRef idx="0">
-            <a:schemeClr val="accent1"/>
-          </a:effectRef>
-          <a:fontRef idx="minor">
-            <a:schemeClr val="lt1"/>
-          </a:fontRef>
-        </p:style>
-        <p:txBody>
-          <a:bodyPr rtlCol="0" anchor="ctr"/>
-          <a:lstStyle/>
-          <a:p>
-            <a:pPr algn="ctr"/>
-            <a:endParaRPr lang="en-US">
-              <a:solidFill>
-                <a:schemeClr val="tx1"/>
-              </a:solidFill>
-            </a:endParaRPr>
-          </a:p>
-        </p:txBody>
-      </p:sp>
-      <p:sp>
-        <p:nvSpPr>
-          <p:cNvPr id="2" name="Title 1">
-            <a:extLst>
-              <a:ext uri="{FF2B5EF4-FFF2-40B4-BE49-F238E27FC236}">
-                <a16:creationId xmlns:a16="http://schemas.microsoft.com/office/drawing/2014/main" id="{B6A05BC4-FE98-4132-B81B-8258CC984EFD}"/>
-              </a:ext>
-            </a:extLst>
-          </p:cNvPr>
-          <p:cNvSpPr>
-            <a:spLocks noGrp="1"/>
-          </p:cNvSpPr>
-          <p:nvPr>
-            <p:ph type="title"/>
-          </p:nvPr>
-        </p:nvSpPr>
-        <p:spPr>
-          <a:xfrm>
-            <a:off x="496112" y="685801"/>
-            <a:ext cx="2743200" cy="5105400"/>
-          </a:xfrm>
-        </p:spPr>
-        <p:txBody>
-          <a:bodyPr>
-            <a:normAutofit/>
-          </a:bodyPr>
-          <a:lstStyle/>
-          <a:p>
-            <a:pPr algn="l"/>
-            <a:r>
-              <a:rPr lang="en-US" sz="3200" dirty="0">
-                <a:solidFill>
-                  <a:srgbClr val="FFFFFF"/>
-                </a:solidFill>
-              </a:rPr>
-              <a:t>Demo</a:t>
-            </a:r>
-          </a:p>
-        </p:txBody>
-      </p:sp>
-      <p:grpSp>
-        <p:nvGrpSpPr>
-          <p:cNvPr id="12" name="Group 11">
-            <a:extLst>
-              <a:ext uri="{FF2B5EF4-FFF2-40B4-BE49-F238E27FC236}">
-                <a16:creationId xmlns:a16="http://schemas.microsoft.com/office/drawing/2014/main" id="{F3842748-48B5-4DD0-A06A-A31C74024A99}"/>
-              </a:ext>
-              <a:ext uri="{C183D7F6-B498-43B3-948B-1728B52AA6E4}">
-                <adec:decorative xmlns:adec="http://schemas.microsoft.com/office/drawing/2017/decorative" val="1"/>
-              </a:ext>
-            </a:extLst>
-          </p:cNvPr>
-          <p:cNvGrpSpPr>
-            <a:grpSpLocks noGrp="1" noUngrp="1" noRot="1" noChangeAspect="1" noMove="1" noResize="1"/>
-          </p:cNvGrpSpPr>
-          <p:nvPr>
-            <p:extLst>
-              <p:ext uri="{386F3935-93C4-4BCD-93E2-E3B085C9AB24}">
-                <p16:designElem xmlns:p16="http://schemas.microsoft.com/office/powerpoint/2015/main" val="1"/>
-              </p:ext>
-            </p:extLst>
-          </p:nvPr>
-        </p:nvGrpSpPr>
-        <p:grpSpPr>
-          <a:xfrm>
-            <a:off x="3315292" y="0"/>
-            <a:ext cx="2436813" cy="6858001"/>
-            <a:chOff x="1320800" y="0"/>
-            <a:chExt cx="2436813" cy="6858001"/>
-          </a:xfrm>
-        </p:grpSpPr>
-        <p:sp>
-          <p:nvSpPr>
-            <p:cNvPr id="13" name="Freeform 6">
-              <a:extLst>
-                <a:ext uri="{FF2B5EF4-FFF2-40B4-BE49-F238E27FC236}">
-                  <a16:creationId xmlns:a16="http://schemas.microsoft.com/office/drawing/2014/main" id="{548E99BE-1071-4690-9B9C-07926CEE5557}"/>
-                </a:ext>
-                <a:ext uri="{C183D7F6-B498-43B3-948B-1728B52AA6E4}">
-                  <adec:decorative xmlns:adec="http://schemas.microsoft.com/office/drawing/2017/decorative" val="1"/>
-                </a:ext>
-              </a:extLst>
-            </p:cNvPr>
-            <p:cNvSpPr/>
-            <p:nvPr>
-              <p:extLst>
-                <p:ext uri="{386F3935-93C4-4BCD-93E2-E3B085C9AB24}">
-                  <p16:designElem xmlns:p16="http://schemas.microsoft.com/office/powerpoint/2015/main" val="1"/>
-                </p:ext>
-              </p:extLst>
-            </p:nvPr>
-          </p:nvSpPr>
-          <p:spPr bwMode="auto">
-            <a:xfrm>
-              <a:off x="1627188" y="0"/>
-              <a:ext cx="1122363" cy="5329238"/>
-            </a:xfrm>
-            <a:custGeom>
-              <a:avLst/>
-              <a:gdLst/>
-              <a:ahLst/>
-              <a:cxnLst/>
-              <a:rect l="0" t="0" r="r" b="b"/>
-              <a:pathLst>
-                <a:path w="707" h="3357">
-                  <a:moveTo>
-                    <a:pt x="0" y="3330"/>
-                  </a:moveTo>
-                  <a:lnTo>
-                    <a:pt x="156" y="3357"/>
-                  </a:lnTo>
-                  <a:lnTo>
-                    <a:pt x="707" y="0"/>
-                  </a:lnTo>
-                  <a:lnTo>
-                    <a:pt x="547" y="0"/>
-                  </a:lnTo>
-                  <a:lnTo>
-                    <a:pt x="0" y="3330"/>
-                  </a:lnTo>
-                  <a:close/>
-                </a:path>
-              </a:pathLst>
-            </a:custGeom>
-            <a:solidFill>
-              <a:schemeClr val="accent1"/>
-            </a:solidFill>
-            <a:ln>
-              <a:noFill/>
-            </a:ln>
-          </p:spPr>
-        </p:sp>
-        <p:sp>
-          <p:nvSpPr>
-            <p:cNvPr id="14" name="Freeform 7">
-              <a:extLst>
-                <a:ext uri="{FF2B5EF4-FFF2-40B4-BE49-F238E27FC236}">
-                  <a16:creationId xmlns:a16="http://schemas.microsoft.com/office/drawing/2014/main" id="{9301F039-B467-413A-B25C-770E51069D42}"/>
-                </a:ext>
-                <a:ext uri="{C183D7F6-B498-43B3-948B-1728B52AA6E4}">
-                  <adec:decorative xmlns:adec="http://schemas.microsoft.com/office/drawing/2017/decorative" val="1"/>
-                </a:ext>
-              </a:extLst>
-            </p:cNvPr>
-            <p:cNvSpPr/>
-            <p:nvPr>
-              <p:extLst>
-                <p:ext uri="{386F3935-93C4-4BCD-93E2-E3B085C9AB24}">
-                  <p16:designElem xmlns:p16="http://schemas.microsoft.com/office/powerpoint/2015/main" val="1"/>
-                </p:ext>
-              </p:extLst>
-            </p:nvPr>
-          </p:nvSpPr>
-          <p:spPr bwMode="auto">
-            <a:xfrm>
-              <a:off x="1320800" y="0"/>
-              <a:ext cx="1117600" cy="5276850"/>
-            </a:xfrm>
-            <a:custGeom>
-              <a:avLst/>
-              <a:gdLst/>
-              <a:ahLst/>
-              <a:cxnLst/>
-              <a:rect l="0" t="0" r="r" b="b"/>
-              <a:pathLst>
-                <a:path w="704" h="3324">
-                  <a:moveTo>
-                    <a:pt x="704" y="0"/>
-                  </a:moveTo>
-                  <a:lnTo>
-                    <a:pt x="545" y="0"/>
-                  </a:lnTo>
-                  <a:lnTo>
-                    <a:pt x="0" y="3300"/>
-                  </a:lnTo>
-                  <a:lnTo>
-                    <a:pt x="157" y="3324"/>
-                  </a:lnTo>
-                  <a:lnTo>
-                    <a:pt x="704" y="0"/>
-                  </a:lnTo>
-                  <a:close/>
-                </a:path>
-              </a:pathLst>
-            </a:custGeom>
-            <a:solidFill>
-              <a:schemeClr val="tx1">
-                <a:lumMod val="65000"/>
-                <a:lumOff val="35000"/>
-              </a:schemeClr>
-            </a:solidFill>
-            <a:ln>
-              <a:noFill/>
-            </a:ln>
-          </p:spPr>
-        </p:sp>
-        <p:sp>
-          <p:nvSpPr>
-            <p:cNvPr id="15" name="Freeform 8">
-              <a:extLst>
-                <a:ext uri="{FF2B5EF4-FFF2-40B4-BE49-F238E27FC236}">
-                  <a16:creationId xmlns:a16="http://schemas.microsoft.com/office/drawing/2014/main" id="{9F06AEC1-5558-49E8-8CAC-FEBD00DF0031}"/>
-                </a:ext>
-                <a:ext uri="{C183D7F6-B498-43B3-948B-1728B52AA6E4}">
-                  <adec:decorative xmlns:adec="http://schemas.microsoft.com/office/drawing/2017/decorative" val="1"/>
-                </a:ext>
-              </a:extLst>
-            </p:cNvPr>
-            <p:cNvSpPr/>
-            <p:nvPr>
-              <p:extLst>
-                <p:ext uri="{386F3935-93C4-4BCD-93E2-E3B085C9AB24}">
-                  <p16:designElem xmlns:p16="http://schemas.microsoft.com/office/powerpoint/2015/main" val="1"/>
-                </p:ext>
-              </p:extLst>
-            </p:nvPr>
-          </p:nvSpPr>
-          <p:spPr bwMode="auto">
-            <a:xfrm>
-              <a:off x="1320800" y="5238750"/>
-              <a:ext cx="1228725" cy="1619250"/>
-            </a:xfrm>
-            <a:custGeom>
-              <a:avLst/>
-              <a:gdLst/>
-              <a:ahLst/>
-              <a:cxnLst/>
-              <a:rect l="0" t="0" r="r" b="b"/>
-              <a:pathLst>
-                <a:path w="774" h="1020">
-                  <a:moveTo>
-                    <a:pt x="0" y="0"/>
-                  </a:moveTo>
-                  <a:lnTo>
-                    <a:pt x="740" y="1020"/>
-                  </a:lnTo>
-                  <a:lnTo>
-                    <a:pt x="774" y="1020"/>
-                  </a:lnTo>
-                  <a:lnTo>
-                    <a:pt x="0" y="0"/>
-                  </a:lnTo>
-                  <a:close/>
-                </a:path>
-              </a:pathLst>
-            </a:custGeom>
-            <a:solidFill>
-              <a:schemeClr val="tx1">
-                <a:lumMod val="85000"/>
-                <a:lumOff val="15000"/>
-              </a:schemeClr>
-            </a:solidFill>
-            <a:ln>
-              <a:noFill/>
-            </a:ln>
-          </p:spPr>
-        </p:sp>
-        <p:sp>
-          <p:nvSpPr>
-            <p:cNvPr id="16" name="Freeform 9">
-              <a:extLst>
-                <a:ext uri="{FF2B5EF4-FFF2-40B4-BE49-F238E27FC236}">
-                  <a16:creationId xmlns:a16="http://schemas.microsoft.com/office/drawing/2014/main" id="{D10B76B9-BA68-471E-B58C-ED91198A9FAB}"/>
-                </a:ext>
-                <a:ext uri="{C183D7F6-B498-43B3-948B-1728B52AA6E4}">
-                  <adec:decorative xmlns:adec="http://schemas.microsoft.com/office/drawing/2017/decorative" val="1"/>
-                </a:ext>
-              </a:extLst>
-            </p:cNvPr>
-            <p:cNvSpPr/>
-            <p:nvPr>
-              <p:extLst>
-                <p:ext uri="{386F3935-93C4-4BCD-93E2-E3B085C9AB24}">
-                  <p16:designElem xmlns:p16="http://schemas.microsoft.com/office/powerpoint/2015/main" val="1"/>
-                </p:ext>
-              </p:extLst>
-            </p:nvPr>
-          </p:nvSpPr>
-          <p:spPr bwMode="auto">
-            <a:xfrm>
-              <a:off x="1627188" y="5291138"/>
-              <a:ext cx="1495425" cy="1566863"/>
-            </a:xfrm>
-            <a:custGeom>
-              <a:avLst/>
-              <a:gdLst/>
-              <a:ahLst/>
-              <a:cxnLst/>
-              <a:rect l="0" t="0" r="r" b="b"/>
-              <a:pathLst>
-                <a:path w="942" h="987">
-                  <a:moveTo>
-                    <a:pt x="0" y="0"/>
-                  </a:moveTo>
-                  <a:lnTo>
-                    <a:pt x="909" y="987"/>
-                  </a:lnTo>
-                  <a:lnTo>
-                    <a:pt x="942" y="987"/>
-                  </a:lnTo>
-                  <a:lnTo>
-                    <a:pt x="0" y="0"/>
-                  </a:lnTo>
-                  <a:close/>
-                </a:path>
-              </a:pathLst>
-            </a:custGeom>
-            <a:solidFill>
-              <a:schemeClr val="accent1">
-                <a:lumMod val="50000"/>
-              </a:schemeClr>
-            </a:solidFill>
-            <a:ln>
-              <a:noFill/>
-            </a:ln>
-          </p:spPr>
-        </p:sp>
-        <p:sp>
-          <p:nvSpPr>
-            <p:cNvPr id="17" name="Freeform 10">
-              <a:extLst>
-                <a:ext uri="{FF2B5EF4-FFF2-40B4-BE49-F238E27FC236}">
-                  <a16:creationId xmlns:a16="http://schemas.microsoft.com/office/drawing/2014/main" id="{FEB3913B-54A3-490E-BA4B-5D0330990FCB}"/>
-                </a:ext>
-                <a:ext uri="{C183D7F6-B498-43B3-948B-1728B52AA6E4}">
-                  <adec:decorative xmlns:adec="http://schemas.microsoft.com/office/drawing/2017/decorative" val="1"/>
-                </a:ext>
-              </a:extLst>
-            </p:cNvPr>
-            <p:cNvSpPr/>
-            <p:nvPr>
-              <p:extLst>
-                <p:ext uri="{386F3935-93C4-4BCD-93E2-E3B085C9AB24}">
-                  <p16:designElem xmlns:p16="http://schemas.microsoft.com/office/powerpoint/2015/main" val="1"/>
-                </p:ext>
-              </p:extLst>
-            </p:nvPr>
-          </p:nvSpPr>
-          <p:spPr bwMode="auto">
-            <a:xfrm>
-              <a:off x="1627188" y="5286375"/>
-              <a:ext cx="2130425" cy="1571625"/>
-            </a:xfrm>
-            <a:custGeom>
-              <a:avLst/>
-              <a:gdLst/>
-              <a:ahLst/>
-              <a:cxnLst/>
-              <a:rect l="0" t="0" r="r" b="b"/>
-              <a:pathLst>
-                <a:path w="1342" h="990">
-                  <a:moveTo>
-                    <a:pt x="0" y="3"/>
-                  </a:moveTo>
-                  <a:lnTo>
-                    <a:pt x="942" y="990"/>
-                  </a:lnTo>
-                  <a:lnTo>
-                    <a:pt x="1342" y="990"/>
-                  </a:lnTo>
-                  <a:lnTo>
-                    <a:pt x="156" y="27"/>
-                  </a:lnTo>
-                  <a:lnTo>
-                    <a:pt x="0" y="0"/>
-                  </a:lnTo>
-                  <a:lnTo>
-                    <a:pt x="0" y="3"/>
-                  </a:lnTo>
-                  <a:close/>
-                </a:path>
-              </a:pathLst>
-            </a:custGeom>
-            <a:solidFill>
-              <a:schemeClr val="accent1">
-                <a:lumMod val="75000"/>
-              </a:schemeClr>
-            </a:solidFill>
-            <a:ln>
-              <a:noFill/>
-            </a:ln>
-          </p:spPr>
-        </p:sp>
-        <p:sp>
-          <p:nvSpPr>
-            <p:cNvPr id="18" name="Freeform 11">
-              <a:extLst>
-                <a:ext uri="{FF2B5EF4-FFF2-40B4-BE49-F238E27FC236}">
-                  <a16:creationId xmlns:a16="http://schemas.microsoft.com/office/drawing/2014/main" id="{F75DC961-08A4-46F8-8A80-2E1FB977E1F4}"/>
-                </a:ext>
-                <a:ext uri="{C183D7F6-B498-43B3-948B-1728B52AA6E4}">
-                  <adec:decorative xmlns:adec="http://schemas.microsoft.com/office/drawing/2017/decorative" val="1"/>
-                </a:ext>
-              </a:extLst>
-            </p:cNvPr>
-            <p:cNvSpPr/>
-            <p:nvPr>
-              <p:extLst>
-                <p:ext uri="{386F3935-93C4-4BCD-93E2-E3B085C9AB24}">
-                  <p16:designElem xmlns:p16="http://schemas.microsoft.com/office/powerpoint/2015/main" val="1"/>
-                </p:ext>
-              </p:extLst>
-            </p:nvPr>
-          </p:nvSpPr>
-          <p:spPr bwMode="auto">
-            <a:xfrm>
-              <a:off x="1320800" y="5238750"/>
-              <a:ext cx="1695450" cy="1619250"/>
-            </a:xfrm>
-            <a:custGeom>
-              <a:avLst/>
-              <a:gdLst/>
-              <a:ahLst/>
-              <a:cxnLst/>
-              <a:rect l="0" t="0" r="r" b="b"/>
-              <a:pathLst>
-                <a:path w="1068" h="1020">
-                  <a:moveTo>
-                    <a:pt x="1068" y="1020"/>
-                  </a:moveTo>
-                  <a:lnTo>
-                    <a:pt x="184" y="60"/>
-                  </a:lnTo>
-                  <a:lnTo>
-                    <a:pt x="154" y="27"/>
-                  </a:lnTo>
-                  <a:lnTo>
-                    <a:pt x="157" y="27"/>
-                  </a:lnTo>
-                  <a:lnTo>
-                    <a:pt x="157" y="24"/>
-                  </a:lnTo>
-                  <a:lnTo>
-                    <a:pt x="154" y="24"/>
-                  </a:lnTo>
-                  <a:lnTo>
-                    <a:pt x="0" y="0"/>
-                  </a:lnTo>
-                  <a:lnTo>
-                    <a:pt x="0" y="0"/>
-                  </a:lnTo>
-                  <a:lnTo>
-                    <a:pt x="774" y="1020"/>
-                  </a:lnTo>
-                  <a:lnTo>
-                    <a:pt x="1068" y="1020"/>
-                  </a:lnTo>
-                  <a:close/>
-                </a:path>
-              </a:pathLst>
-            </a:custGeom>
-            <a:solidFill>
-              <a:schemeClr val="tx1">
-                <a:lumMod val="75000"/>
-                <a:lumOff val="25000"/>
-              </a:schemeClr>
-            </a:solidFill>
-            <a:ln>
-              <a:noFill/>
-            </a:ln>
-          </p:spPr>
-        </p:sp>
-      </p:grpSp>
-      <p:pic>
-        <p:nvPicPr>
-          <p:cNvPr id="4" name="Online Media 3" title="MineCart Demo">
-            <a:hlinkClick r:id="" action="ppaction://media"/>
-            <a:extLst>
-              <a:ext uri="{FF2B5EF4-FFF2-40B4-BE49-F238E27FC236}">
-                <a16:creationId xmlns:a16="http://schemas.microsoft.com/office/drawing/2014/main" id="{92753453-0EB1-4A08-A03B-5238A8D8341F}"/>
-              </a:ext>
-            </a:extLst>
-          </p:cNvPr>
-          <p:cNvPicPr>
-            <a:picLocks noGrp="1" noRot="1" noChangeAspect="1"/>
-          </p:cNvPicPr>
-          <p:nvPr>
-            <p:ph idx="1"/>
-            <a:videoFile r:link="rId1"/>
-          </p:nvPr>
-        </p:nvPicPr>
-        <p:blipFill>
-          <a:blip r:embed="rId4"/>
-          <a:stretch>
-            <a:fillRect/>
-          </a:stretch>
-        </p:blipFill>
-        <p:spPr>
-          <a:xfrm>
-            <a:off x="4703263" y="1265382"/>
-            <a:ext cx="7309300" cy="4111481"/>
-          </a:xfrm>
-          <a:prstGeom prst="rect">
-            <a:avLst/>
-          </a:prstGeom>
-          <a:ln>
-            <a:solidFill>
-              <a:schemeClr val="accent1"/>
-            </a:solidFill>
-          </a:ln>
-        </p:spPr>
-      </p:pic>
-    </p:spTree>
-    <p:extLst>
-      <p:ext uri="{BB962C8B-B14F-4D97-AF65-F5344CB8AC3E}">
-        <p14:creationId xmlns:p14="http://schemas.microsoft.com/office/powerpoint/2010/main" val="59944253"/>
-      </p:ext>
-    </p:extLst>
-  </p:cSld>
-  <p:clrMapOvr>
-    <a:masterClrMapping/>
-  </p:clrMapOvr>
-</p:sld>
-</file>
-
-<file path=ppt/slides/slide4.xml><?xml version="1.0" encoding="utf-8"?>
-<p:sld xmlns:a="http://schemas.openxmlformats.org/drawingml/2006/main" xmlns:r="http://schemas.openxmlformats.org/officeDocument/2006/relationships" xmlns:p="http://schemas.openxmlformats.org/presentationml/2006/main">
-  <p:cSld>
-    <p:bg>
-      <p:bgPr>
-        <a:blipFill rotWithShape="1">
           <a:blip r:embed="rId2">
             <a:duotone>
               <a:schemeClr val="bg2">
@@ -10025,6 +9228,803 @@
     <p:extLst>
       <p:ext uri="{BB962C8B-B14F-4D97-AF65-F5344CB8AC3E}">
         <p14:creationId xmlns:p14="http://schemas.microsoft.com/office/powerpoint/2010/main" val="2363300466"/>
+      </p:ext>
+    </p:extLst>
+  </p:cSld>
+  <p:clrMapOvr>
+    <a:masterClrMapping/>
+  </p:clrMapOvr>
+</p:sld>
+</file>
+
+<file path=ppt/slides/slide4.xml><?xml version="1.0" encoding="utf-8"?>
+<p:sld xmlns:a="http://schemas.openxmlformats.org/drawingml/2006/main" xmlns:r="http://schemas.openxmlformats.org/officeDocument/2006/relationships" xmlns:p="http://schemas.openxmlformats.org/presentationml/2006/main">
+  <p:cSld>
+    <p:bg>
+      <p:bgPr>
+        <a:blipFill rotWithShape="1">
+          <a:blip r:embed="rId3">
+            <a:duotone>
+              <a:schemeClr val="bg2">
+                <a:shade val="76000"/>
+                <a:satMod val="180000"/>
+              </a:schemeClr>
+              <a:schemeClr val="bg2">
+                <a:tint val="80000"/>
+                <a:satMod val="120000"/>
+                <a:lumMod val="180000"/>
+              </a:schemeClr>
+            </a:duotone>
+            <a:extLst/>
+          </a:blip>
+          <a:stretch/>
+        </a:blipFill>
+        <a:effectLst/>
+      </p:bgPr>
+    </p:bg>
+    <p:spTree>
+      <p:nvGrpSpPr>
+        <p:cNvPr id="1" name=""/>
+        <p:cNvGrpSpPr/>
+        <p:nvPr/>
+      </p:nvGrpSpPr>
+      <p:grpSpPr>
+        <a:xfrm>
+          <a:off x="0" y="0"/>
+          <a:ext cx="0" cy="0"/>
+          <a:chOff x="0" y="0"/>
+          <a:chExt cx="0" cy="0"/>
+        </a:xfrm>
+      </p:grpSpPr>
+      <p:sp useBgFill="1">
+        <p:nvSpPr>
+          <p:cNvPr id="8" name="Rectangle 7">
+            <a:extLst>
+              <a:ext uri="{FF2B5EF4-FFF2-40B4-BE49-F238E27FC236}">
+                <a16:creationId xmlns:a16="http://schemas.microsoft.com/office/drawing/2014/main" id="{C8643778-7F6C-4E8D-84D1-D5CDB9928191}"/>
+              </a:ext>
+              <a:ext uri="{C183D7F6-B498-43B3-948B-1728B52AA6E4}">
+                <adec:decorative xmlns:adec="http://schemas.microsoft.com/office/drawing/2017/decorative" val="1"/>
+              </a:ext>
+            </a:extLst>
+          </p:cNvPr>
+          <p:cNvSpPr>
+            <a:spLocks noGrp="1" noRot="1" noChangeAspect="1" noMove="1" noResize="1" noEditPoints="1" noAdjustHandles="1" noChangeArrowheads="1" noChangeShapeType="1" noTextEdit="1"/>
+          </p:cNvSpPr>
+          <p:nvPr>
+            <p:extLst>
+              <p:ext uri="{386F3935-93C4-4BCD-93E2-E3B085C9AB24}">
+                <p16:designElem xmlns:p16="http://schemas.microsoft.com/office/powerpoint/2015/main" val="1"/>
+              </p:ext>
+            </p:extLst>
+          </p:nvPr>
+        </p:nvSpPr>
+        <p:spPr>
+          <a:xfrm>
+            <a:off x="0" y="0"/>
+            <a:ext cx="12192000" cy="6858000"/>
+          </a:xfrm>
+          <a:prstGeom prst="rect">
+            <a:avLst/>
+          </a:prstGeom>
+          <a:ln>
+            <a:noFill/>
+          </a:ln>
+        </p:spPr>
+        <p:style>
+          <a:lnRef idx="2">
+            <a:schemeClr val="accent1">
+              <a:shade val="50000"/>
+            </a:schemeClr>
+          </a:lnRef>
+          <a:fillRef idx="1">
+            <a:schemeClr val="accent1"/>
+          </a:fillRef>
+          <a:effectRef idx="0">
+            <a:schemeClr val="accent1"/>
+          </a:effectRef>
+          <a:fontRef idx="minor">
+            <a:schemeClr val="lt1"/>
+          </a:fontRef>
+        </p:style>
+        <p:txBody>
+          <a:bodyPr rtlCol="0" anchor="ctr"/>
+          <a:lstStyle/>
+          <a:p>
+            <a:pPr algn="ctr"/>
+            <a:endParaRPr lang="en-US"/>
+          </a:p>
+        </p:txBody>
+      </p:sp>
+      <p:sp>
+        <p:nvSpPr>
+          <p:cNvPr id="10" name="Freeform: Shape 9">
+            <a:extLst>
+              <a:ext uri="{FF2B5EF4-FFF2-40B4-BE49-F238E27FC236}">
+                <a16:creationId xmlns:a16="http://schemas.microsoft.com/office/drawing/2014/main" id="{1D22F88D-6907-48AF-B024-346E855E0D96}"/>
+              </a:ext>
+              <a:ext uri="{C183D7F6-B498-43B3-948B-1728B52AA6E4}">
+                <adec:decorative xmlns:adec="http://schemas.microsoft.com/office/drawing/2017/decorative" val="1"/>
+              </a:ext>
+            </a:extLst>
+          </p:cNvPr>
+          <p:cNvSpPr>
+            <a:spLocks noGrp="1" noRot="1" noChangeAspect="1" noMove="1" noResize="1" noEditPoints="1" noAdjustHandles="1" noChangeArrowheads="1" noChangeShapeType="1" noTextEdit="1"/>
+          </p:cNvSpPr>
+          <p:nvPr>
+            <p:extLst>
+              <p:ext uri="{386F3935-93C4-4BCD-93E2-E3B085C9AB24}">
+                <p16:designElem xmlns:p16="http://schemas.microsoft.com/office/powerpoint/2015/main" val="1"/>
+              </p:ext>
+            </p:extLst>
+          </p:nvPr>
+        </p:nvSpPr>
+        <p:spPr>
+          <a:xfrm flipV="1">
+            <a:off x="-1" y="-1"/>
+            <a:ext cx="4403709" cy="6858001"/>
+          </a:xfrm>
+          <a:custGeom>
+            <a:avLst/>
+            <a:gdLst>
+              <a:gd name="connsiteX0" fmla="*/ 3223890 w 4403709"/>
+              <a:gd name="connsiteY0" fmla="*/ 6858001 h 6858001"/>
+              <a:gd name="connsiteX1" fmla="*/ 4101908 w 4403709"/>
+              <a:gd name="connsiteY1" fmla="*/ 6858001 h 6858001"/>
+              <a:gd name="connsiteX2" fmla="*/ 3254950 w 4403709"/>
+              <a:gd name="connsiteY2" fmla="*/ 1599356 h 6858001"/>
+              <a:gd name="connsiteX3" fmla="*/ 3254950 w 4403709"/>
+              <a:gd name="connsiteY3" fmla="*/ 1594062 h 6858001"/>
+              <a:gd name="connsiteX4" fmla="*/ 4403709 w 4403709"/>
+              <a:gd name="connsiteY4" fmla="*/ 0 h 6858001"/>
+              <a:gd name="connsiteX5" fmla="*/ 3254950 w 4403709"/>
+              <a:gd name="connsiteY5" fmla="*/ 0 h 6858001"/>
+              <a:gd name="connsiteX6" fmla="*/ 2903520 w 4403709"/>
+              <a:gd name="connsiteY6" fmla="*/ 0 h 6858001"/>
+              <a:gd name="connsiteX7" fmla="*/ 0 w 4403709"/>
+              <a:gd name="connsiteY7" fmla="*/ 0 h 6858001"/>
+              <a:gd name="connsiteX8" fmla="*/ 0 w 4403709"/>
+              <a:gd name="connsiteY8" fmla="*/ 6858000 h 6858001"/>
+              <a:gd name="connsiteX9" fmla="*/ 3223890 w 4403709"/>
+              <a:gd name="connsiteY9" fmla="*/ 6858000 h 6858001"/>
+            </a:gdLst>
+            <a:ahLst/>
+            <a:cxnLst>
+              <a:cxn ang="0">
+                <a:pos x="connsiteX0" y="connsiteY0"/>
+              </a:cxn>
+              <a:cxn ang="0">
+                <a:pos x="connsiteX1" y="connsiteY1"/>
+              </a:cxn>
+              <a:cxn ang="0">
+                <a:pos x="connsiteX2" y="connsiteY2"/>
+              </a:cxn>
+              <a:cxn ang="0">
+                <a:pos x="connsiteX3" y="connsiteY3"/>
+              </a:cxn>
+              <a:cxn ang="0">
+                <a:pos x="connsiteX4" y="connsiteY4"/>
+              </a:cxn>
+              <a:cxn ang="0">
+                <a:pos x="connsiteX5" y="connsiteY5"/>
+              </a:cxn>
+              <a:cxn ang="0">
+                <a:pos x="connsiteX6" y="connsiteY6"/>
+              </a:cxn>
+              <a:cxn ang="0">
+                <a:pos x="connsiteX7" y="connsiteY7"/>
+              </a:cxn>
+              <a:cxn ang="0">
+                <a:pos x="connsiteX8" y="connsiteY8"/>
+              </a:cxn>
+              <a:cxn ang="0">
+                <a:pos x="connsiteX9" y="connsiteY9"/>
+              </a:cxn>
+            </a:cxnLst>
+            <a:rect l="l" t="t" r="r" b="b"/>
+            <a:pathLst>
+              <a:path w="4403709" h="6858001">
+                <a:moveTo>
+                  <a:pt x="3223890" y="6858001"/>
+                </a:moveTo>
+                <a:lnTo>
+                  <a:pt x="4101908" y="6858001"/>
+                </a:lnTo>
+                <a:lnTo>
+                  <a:pt x="3254950" y="1599356"/>
+                </a:lnTo>
+                <a:lnTo>
+                  <a:pt x="3254950" y="1594062"/>
+                </a:lnTo>
+                <a:lnTo>
+                  <a:pt x="4403709" y="0"/>
+                </a:lnTo>
+                <a:lnTo>
+                  <a:pt x="3254950" y="0"/>
+                </a:lnTo>
+                <a:lnTo>
+                  <a:pt x="2903520" y="0"/>
+                </a:lnTo>
+                <a:lnTo>
+                  <a:pt x="0" y="0"/>
+                </a:lnTo>
+                <a:lnTo>
+                  <a:pt x="0" y="6858000"/>
+                </a:lnTo>
+                <a:lnTo>
+                  <a:pt x="3223890" y="6858000"/>
+                </a:lnTo>
+                <a:close/>
+              </a:path>
+            </a:pathLst>
+          </a:custGeom>
+          <a:gradFill flip="none" rotWithShape="1">
+            <a:gsLst>
+              <a:gs pos="0">
+                <a:schemeClr val="accent1">
+                  <a:lumMod val="89000"/>
+                </a:schemeClr>
+              </a:gs>
+              <a:gs pos="23000">
+                <a:schemeClr val="accent1">
+                  <a:lumMod val="89000"/>
+                </a:schemeClr>
+              </a:gs>
+              <a:gs pos="69000">
+                <a:schemeClr val="accent1">
+                  <a:lumMod val="75000"/>
+                </a:schemeClr>
+              </a:gs>
+              <a:gs pos="97000">
+                <a:schemeClr val="accent1">
+                  <a:lumMod val="70000"/>
+                </a:schemeClr>
+              </a:gs>
+            </a:gsLst>
+            <a:path path="circle">
+              <a:fillToRect l="50000" t="50000" r="50000" b="50000"/>
+            </a:path>
+            <a:tileRect/>
+          </a:gradFill>
+          <a:ln>
+            <a:noFill/>
+          </a:ln>
+        </p:spPr>
+        <p:style>
+          <a:lnRef idx="2">
+            <a:schemeClr val="accent1">
+              <a:shade val="50000"/>
+            </a:schemeClr>
+          </a:lnRef>
+          <a:fillRef idx="1002">
+            <a:schemeClr val="dk1"/>
+          </a:fillRef>
+          <a:effectRef idx="0">
+            <a:schemeClr val="accent1"/>
+          </a:effectRef>
+          <a:fontRef idx="minor">
+            <a:schemeClr val="lt1"/>
+          </a:fontRef>
+        </p:style>
+        <p:txBody>
+          <a:bodyPr rtlCol="0" anchor="ctr"/>
+          <a:lstStyle/>
+          <a:p>
+            <a:pPr algn="ctr"/>
+            <a:endParaRPr lang="en-US">
+              <a:solidFill>
+                <a:schemeClr val="tx1"/>
+              </a:solidFill>
+            </a:endParaRPr>
+          </a:p>
+        </p:txBody>
+      </p:sp>
+      <p:sp>
+        <p:nvSpPr>
+          <p:cNvPr id="2" name="Title 1">
+            <a:extLst>
+              <a:ext uri="{FF2B5EF4-FFF2-40B4-BE49-F238E27FC236}">
+                <a16:creationId xmlns:a16="http://schemas.microsoft.com/office/drawing/2014/main" id="{B6A05BC4-FE98-4132-B81B-8258CC984EFD}"/>
+              </a:ext>
+            </a:extLst>
+          </p:cNvPr>
+          <p:cNvSpPr>
+            <a:spLocks noGrp="1"/>
+          </p:cNvSpPr>
+          <p:nvPr>
+            <p:ph type="title"/>
+          </p:nvPr>
+        </p:nvSpPr>
+        <p:spPr>
+          <a:xfrm>
+            <a:off x="496112" y="685801"/>
+            <a:ext cx="2743200" cy="5105400"/>
+          </a:xfrm>
+        </p:spPr>
+        <p:txBody>
+          <a:bodyPr>
+            <a:normAutofit/>
+          </a:bodyPr>
+          <a:lstStyle/>
+          <a:p>
+            <a:pPr algn="l"/>
+            <a:r>
+              <a:rPr lang="en-US" sz="3200" dirty="0">
+                <a:solidFill>
+                  <a:srgbClr val="FFFFFF"/>
+                </a:solidFill>
+              </a:rPr>
+              <a:t>Demo</a:t>
+            </a:r>
+          </a:p>
+        </p:txBody>
+      </p:sp>
+      <p:grpSp>
+        <p:nvGrpSpPr>
+          <p:cNvPr id="12" name="Group 11">
+            <a:extLst>
+              <a:ext uri="{FF2B5EF4-FFF2-40B4-BE49-F238E27FC236}">
+                <a16:creationId xmlns:a16="http://schemas.microsoft.com/office/drawing/2014/main" id="{F3842748-48B5-4DD0-A06A-A31C74024A99}"/>
+              </a:ext>
+              <a:ext uri="{C183D7F6-B498-43B3-948B-1728B52AA6E4}">
+                <adec:decorative xmlns:adec="http://schemas.microsoft.com/office/drawing/2017/decorative" val="1"/>
+              </a:ext>
+            </a:extLst>
+          </p:cNvPr>
+          <p:cNvGrpSpPr>
+            <a:grpSpLocks noGrp="1" noUngrp="1" noRot="1" noChangeAspect="1" noMove="1" noResize="1"/>
+          </p:cNvGrpSpPr>
+          <p:nvPr>
+            <p:extLst>
+              <p:ext uri="{386F3935-93C4-4BCD-93E2-E3B085C9AB24}">
+                <p16:designElem xmlns:p16="http://schemas.microsoft.com/office/powerpoint/2015/main" val="1"/>
+              </p:ext>
+            </p:extLst>
+          </p:nvPr>
+        </p:nvGrpSpPr>
+        <p:grpSpPr>
+          <a:xfrm>
+            <a:off x="3315292" y="0"/>
+            <a:ext cx="2436813" cy="6858001"/>
+            <a:chOff x="1320800" y="0"/>
+            <a:chExt cx="2436813" cy="6858001"/>
+          </a:xfrm>
+        </p:grpSpPr>
+        <p:sp>
+          <p:nvSpPr>
+            <p:cNvPr id="13" name="Freeform 6">
+              <a:extLst>
+                <a:ext uri="{FF2B5EF4-FFF2-40B4-BE49-F238E27FC236}">
+                  <a16:creationId xmlns:a16="http://schemas.microsoft.com/office/drawing/2014/main" id="{548E99BE-1071-4690-9B9C-07926CEE5557}"/>
+                </a:ext>
+                <a:ext uri="{C183D7F6-B498-43B3-948B-1728B52AA6E4}">
+                  <adec:decorative xmlns:adec="http://schemas.microsoft.com/office/drawing/2017/decorative" val="1"/>
+                </a:ext>
+              </a:extLst>
+            </p:cNvPr>
+            <p:cNvSpPr/>
+            <p:nvPr>
+              <p:extLst>
+                <p:ext uri="{386F3935-93C4-4BCD-93E2-E3B085C9AB24}">
+                  <p16:designElem xmlns:p16="http://schemas.microsoft.com/office/powerpoint/2015/main" val="1"/>
+                </p:ext>
+              </p:extLst>
+            </p:nvPr>
+          </p:nvSpPr>
+          <p:spPr bwMode="auto">
+            <a:xfrm>
+              <a:off x="1627188" y="0"/>
+              <a:ext cx="1122363" cy="5329238"/>
+            </a:xfrm>
+            <a:custGeom>
+              <a:avLst/>
+              <a:gdLst/>
+              <a:ahLst/>
+              <a:cxnLst/>
+              <a:rect l="0" t="0" r="r" b="b"/>
+              <a:pathLst>
+                <a:path w="707" h="3357">
+                  <a:moveTo>
+                    <a:pt x="0" y="3330"/>
+                  </a:moveTo>
+                  <a:lnTo>
+                    <a:pt x="156" y="3357"/>
+                  </a:lnTo>
+                  <a:lnTo>
+                    <a:pt x="707" y="0"/>
+                  </a:lnTo>
+                  <a:lnTo>
+                    <a:pt x="547" y="0"/>
+                  </a:lnTo>
+                  <a:lnTo>
+                    <a:pt x="0" y="3330"/>
+                  </a:lnTo>
+                  <a:close/>
+                </a:path>
+              </a:pathLst>
+            </a:custGeom>
+            <a:solidFill>
+              <a:schemeClr val="accent1"/>
+            </a:solidFill>
+            <a:ln>
+              <a:noFill/>
+            </a:ln>
+          </p:spPr>
+        </p:sp>
+        <p:sp>
+          <p:nvSpPr>
+            <p:cNvPr id="14" name="Freeform 7">
+              <a:extLst>
+                <a:ext uri="{FF2B5EF4-FFF2-40B4-BE49-F238E27FC236}">
+                  <a16:creationId xmlns:a16="http://schemas.microsoft.com/office/drawing/2014/main" id="{9301F039-B467-413A-B25C-770E51069D42}"/>
+                </a:ext>
+                <a:ext uri="{C183D7F6-B498-43B3-948B-1728B52AA6E4}">
+                  <adec:decorative xmlns:adec="http://schemas.microsoft.com/office/drawing/2017/decorative" val="1"/>
+                </a:ext>
+              </a:extLst>
+            </p:cNvPr>
+            <p:cNvSpPr/>
+            <p:nvPr>
+              <p:extLst>
+                <p:ext uri="{386F3935-93C4-4BCD-93E2-E3B085C9AB24}">
+                  <p16:designElem xmlns:p16="http://schemas.microsoft.com/office/powerpoint/2015/main" val="1"/>
+                </p:ext>
+              </p:extLst>
+            </p:nvPr>
+          </p:nvSpPr>
+          <p:spPr bwMode="auto">
+            <a:xfrm>
+              <a:off x="1320800" y="0"/>
+              <a:ext cx="1117600" cy="5276850"/>
+            </a:xfrm>
+            <a:custGeom>
+              <a:avLst/>
+              <a:gdLst/>
+              <a:ahLst/>
+              <a:cxnLst/>
+              <a:rect l="0" t="0" r="r" b="b"/>
+              <a:pathLst>
+                <a:path w="704" h="3324">
+                  <a:moveTo>
+                    <a:pt x="704" y="0"/>
+                  </a:moveTo>
+                  <a:lnTo>
+                    <a:pt x="545" y="0"/>
+                  </a:lnTo>
+                  <a:lnTo>
+                    <a:pt x="0" y="3300"/>
+                  </a:lnTo>
+                  <a:lnTo>
+                    <a:pt x="157" y="3324"/>
+                  </a:lnTo>
+                  <a:lnTo>
+                    <a:pt x="704" y="0"/>
+                  </a:lnTo>
+                  <a:close/>
+                </a:path>
+              </a:pathLst>
+            </a:custGeom>
+            <a:solidFill>
+              <a:schemeClr val="tx1">
+                <a:lumMod val="65000"/>
+                <a:lumOff val="35000"/>
+              </a:schemeClr>
+            </a:solidFill>
+            <a:ln>
+              <a:noFill/>
+            </a:ln>
+          </p:spPr>
+        </p:sp>
+        <p:sp>
+          <p:nvSpPr>
+            <p:cNvPr id="15" name="Freeform 8">
+              <a:extLst>
+                <a:ext uri="{FF2B5EF4-FFF2-40B4-BE49-F238E27FC236}">
+                  <a16:creationId xmlns:a16="http://schemas.microsoft.com/office/drawing/2014/main" id="{9F06AEC1-5558-49E8-8CAC-FEBD00DF0031}"/>
+                </a:ext>
+                <a:ext uri="{C183D7F6-B498-43B3-948B-1728B52AA6E4}">
+                  <adec:decorative xmlns:adec="http://schemas.microsoft.com/office/drawing/2017/decorative" val="1"/>
+                </a:ext>
+              </a:extLst>
+            </p:cNvPr>
+            <p:cNvSpPr/>
+            <p:nvPr>
+              <p:extLst>
+                <p:ext uri="{386F3935-93C4-4BCD-93E2-E3B085C9AB24}">
+                  <p16:designElem xmlns:p16="http://schemas.microsoft.com/office/powerpoint/2015/main" val="1"/>
+                </p:ext>
+              </p:extLst>
+            </p:nvPr>
+          </p:nvSpPr>
+          <p:spPr bwMode="auto">
+            <a:xfrm>
+              <a:off x="1320800" y="5238750"/>
+              <a:ext cx="1228725" cy="1619250"/>
+            </a:xfrm>
+            <a:custGeom>
+              <a:avLst/>
+              <a:gdLst/>
+              <a:ahLst/>
+              <a:cxnLst/>
+              <a:rect l="0" t="0" r="r" b="b"/>
+              <a:pathLst>
+                <a:path w="774" h="1020">
+                  <a:moveTo>
+                    <a:pt x="0" y="0"/>
+                  </a:moveTo>
+                  <a:lnTo>
+                    <a:pt x="740" y="1020"/>
+                  </a:lnTo>
+                  <a:lnTo>
+                    <a:pt x="774" y="1020"/>
+                  </a:lnTo>
+                  <a:lnTo>
+                    <a:pt x="0" y="0"/>
+                  </a:lnTo>
+                  <a:close/>
+                </a:path>
+              </a:pathLst>
+            </a:custGeom>
+            <a:solidFill>
+              <a:schemeClr val="tx1">
+                <a:lumMod val="85000"/>
+                <a:lumOff val="15000"/>
+              </a:schemeClr>
+            </a:solidFill>
+            <a:ln>
+              <a:noFill/>
+            </a:ln>
+          </p:spPr>
+        </p:sp>
+        <p:sp>
+          <p:nvSpPr>
+            <p:cNvPr id="16" name="Freeform 9">
+              <a:extLst>
+                <a:ext uri="{FF2B5EF4-FFF2-40B4-BE49-F238E27FC236}">
+                  <a16:creationId xmlns:a16="http://schemas.microsoft.com/office/drawing/2014/main" id="{D10B76B9-BA68-471E-B58C-ED91198A9FAB}"/>
+                </a:ext>
+                <a:ext uri="{C183D7F6-B498-43B3-948B-1728B52AA6E4}">
+                  <adec:decorative xmlns:adec="http://schemas.microsoft.com/office/drawing/2017/decorative" val="1"/>
+                </a:ext>
+              </a:extLst>
+            </p:cNvPr>
+            <p:cNvSpPr/>
+            <p:nvPr>
+              <p:extLst>
+                <p:ext uri="{386F3935-93C4-4BCD-93E2-E3B085C9AB24}">
+                  <p16:designElem xmlns:p16="http://schemas.microsoft.com/office/powerpoint/2015/main" val="1"/>
+                </p:ext>
+              </p:extLst>
+            </p:nvPr>
+          </p:nvSpPr>
+          <p:spPr bwMode="auto">
+            <a:xfrm>
+              <a:off x="1627188" y="5291138"/>
+              <a:ext cx="1495425" cy="1566863"/>
+            </a:xfrm>
+            <a:custGeom>
+              <a:avLst/>
+              <a:gdLst/>
+              <a:ahLst/>
+              <a:cxnLst/>
+              <a:rect l="0" t="0" r="r" b="b"/>
+              <a:pathLst>
+                <a:path w="942" h="987">
+                  <a:moveTo>
+                    <a:pt x="0" y="0"/>
+                  </a:moveTo>
+                  <a:lnTo>
+                    <a:pt x="909" y="987"/>
+                  </a:lnTo>
+                  <a:lnTo>
+                    <a:pt x="942" y="987"/>
+                  </a:lnTo>
+                  <a:lnTo>
+                    <a:pt x="0" y="0"/>
+                  </a:lnTo>
+                  <a:close/>
+                </a:path>
+              </a:pathLst>
+            </a:custGeom>
+            <a:solidFill>
+              <a:schemeClr val="accent1">
+                <a:lumMod val="50000"/>
+              </a:schemeClr>
+            </a:solidFill>
+            <a:ln>
+              <a:noFill/>
+            </a:ln>
+          </p:spPr>
+        </p:sp>
+        <p:sp>
+          <p:nvSpPr>
+            <p:cNvPr id="17" name="Freeform 10">
+              <a:extLst>
+                <a:ext uri="{FF2B5EF4-FFF2-40B4-BE49-F238E27FC236}">
+                  <a16:creationId xmlns:a16="http://schemas.microsoft.com/office/drawing/2014/main" id="{FEB3913B-54A3-490E-BA4B-5D0330990FCB}"/>
+                </a:ext>
+                <a:ext uri="{C183D7F6-B498-43B3-948B-1728B52AA6E4}">
+                  <adec:decorative xmlns:adec="http://schemas.microsoft.com/office/drawing/2017/decorative" val="1"/>
+                </a:ext>
+              </a:extLst>
+            </p:cNvPr>
+            <p:cNvSpPr/>
+            <p:nvPr>
+              <p:extLst>
+                <p:ext uri="{386F3935-93C4-4BCD-93E2-E3B085C9AB24}">
+                  <p16:designElem xmlns:p16="http://schemas.microsoft.com/office/powerpoint/2015/main" val="1"/>
+                </p:ext>
+              </p:extLst>
+            </p:nvPr>
+          </p:nvSpPr>
+          <p:spPr bwMode="auto">
+            <a:xfrm>
+              <a:off x="1627188" y="5286375"/>
+              <a:ext cx="2130425" cy="1571625"/>
+            </a:xfrm>
+            <a:custGeom>
+              <a:avLst/>
+              <a:gdLst/>
+              <a:ahLst/>
+              <a:cxnLst/>
+              <a:rect l="0" t="0" r="r" b="b"/>
+              <a:pathLst>
+                <a:path w="1342" h="990">
+                  <a:moveTo>
+                    <a:pt x="0" y="3"/>
+                  </a:moveTo>
+                  <a:lnTo>
+                    <a:pt x="942" y="990"/>
+                  </a:lnTo>
+                  <a:lnTo>
+                    <a:pt x="1342" y="990"/>
+                  </a:lnTo>
+                  <a:lnTo>
+                    <a:pt x="156" y="27"/>
+                  </a:lnTo>
+                  <a:lnTo>
+                    <a:pt x="0" y="0"/>
+                  </a:lnTo>
+                  <a:lnTo>
+                    <a:pt x="0" y="3"/>
+                  </a:lnTo>
+                  <a:close/>
+                </a:path>
+              </a:pathLst>
+            </a:custGeom>
+            <a:solidFill>
+              <a:schemeClr val="accent1">
+                <a:lumMod val="75000"/>
+              </a:schemeClr>
+            </a:solidFill>
+            <a:ln>
+              <a:noFill/>
+            </a:ln>
+          </p:spPr>
+        </p:sp>
+        <p:sp>
+          <p:nvSpPr>
+            <p:cNvPr id="18" name="Freeform 11">
+              <a:extLst>
+                <a:ext uri="{FF2B5EF4-FFF2-40B4-BE49-F238E27FC236}">
+                  <a16:creationId xmlns:a16="http://schemas.microsoft.com/office/drawing/2014/main" id="{F75DC961-08A4-46F8-8A80-2E1FB977E1F4}"/>
+                </a:ext>
+                <a:ext uri="{C183D7F6-B498-43B3-948B-1728B52AA6E4}">
+                  <adec:decorative xmlns:adec="http://schemas.microsoft.com/office/drawing/2017/decorative" val="1"/>
+                </a:ext>
+              </a:extLst>
+            </p:cNvPr>
+            <p:cNvSpPr/>
+            <p:nvPr>
+              <p:extLst>
+                <p:ext uri="{386F3935-93C4-4BCD-93E2-E3B085C9AB24}">
+                  <p16:designElem xmlns:p16="http://schemas.microsoft.com/office/powerpoint/2015/main" val="1"/>
+                </p:ext>
+              </p:extLst>
+            </p:nvPr>
+          </p:nvSpPr>
+          <p:spPr bwMode="auto">
+            <a:xfrm>
+              <a:off x="1320800" y="5238750"/>
+              <a:ext cx="1695450" cy="1619250"/>
+            </a:xfrm>
+            <a:custGeom>
+              <a:avLst/>
+              <a:gdLst/>
+              <a:ahLst/>
+              <a:cxnLst/>
+              <a:rect l="0" t="0" r="r" b="b"/>
+              <a:pathLst>
+                <a:path w="1068" h="1020">
+                  <a:moveTo>
+                    <a:pt x="1068" y="1020"/>
+                  </a:moveTo>
+                  <a:lnTo>
+                    <a:pt x="184" y="60"/>
+                  </a:lnTo>
+                  <a:lnTo>
+                    <a:pt x="154" y="27"/>
+                  </a:lnTo>
+                  <a:lnTo>
+                    <a:pt x="157" y="27"/>
+                  </a:lnTo>
+                  <a:lnTo>
+                    <a:pt x="157" y="24"/>
+                  </a:lnTo>
+                  <a:lnTo>
+                    <a:pt x="154" y="24"/>
+                  </a:lnTo>
+                  <a:lnTo>
+                    <a:pt x="0" y="0"/>
+                  </a:lnTo>
+                  <a:lnTo>
+                    <a:pt x="0" y="0"/>
+                  </a:lnTo>
+                  <a:lnTo>
+                    <a:pt x="774" y="1020"/>
+                  </a:lnTo>
+                  <a:lnTo>
+                    <a:pt x="1068" y="1020"/>
+                  </a:lnTo>
+                  <a:close/>
+                </a:path>
+              </a:pathLst>
+            </a:custGeom>
+            <a:solidFill>
+              <a:schemeClr val="tx1">
+                <a:lumMod val="75000"/>
+                <a:lumOff val="25000"/>
+              </a:schemeClr>
+            </a:solidFill>
+            <a:ln>
+              <a:noFill/>
+            </a:ln>
+          </p:spPr>
+        </p:sp>
+      </p:grpSp>
+      <p:pic>
+        <p:nvPicPr>
+          <p:cNvPr id="4" name="Online Media 3" title="MineCart Demo">
+            <a:hlinkClick r:id="" action="ppaction://media"/>
+            <a:extLst>
+              <a:ext uri="{FF2B5EF4-FFF2-40B4-BE49-F238E27FC236}">
+                <a16:creationId xmlns:a16="http://schemas.microsoft.com/office/drawing/2014/main" id="{92753453-0EB1-4A08-A03B-5238A8D8341F}"/>
+              </a:ext>
+            </a:extLst>
+          </p:cNvPr>
+          <p:cNvPicPr>
+            <a:picLocks noGrp="1" noRot="1" noChangeAspect="1"/>
+          </p:cNvPicPr>
+          <p:nvPr>
+            <p:ph idx="1"/>
+            <a:videoFile r:link="rId1"/>
+          </p:nvPr>
+        </p:nvPicPr>
+        <p:blipFill>
+          <a:blip r:embed="rId4"/>
+          <a:stretch>
+            <a:fillRect/>
+          </a:stretch>
+        </p:blipFill>
+        <p:spPr>
+          <a:xfrm>
+            <a:off x="4703263" y="1265382"/>
+            <a:ext cx="7309300" cy="4111481"/>
+          </a:xfrm>
+          <a:prstGeom prst="rect">
+            <a:avLst/>
+          </a:prstGeom>
+          <a:ln>
+            <a:solidFill>
+              <a:srgbClr val="991717"/>
+            </a:solidFill>
+          </a:ln>
+        </p:spPr>
+      </p:pic>
+    </p:spTree>
+    <p:extLst>
+      <p:ext uri="{BB962C8B-B14F-4D97-AF65-F5344CB8AC3E}">
+        <p14:creationId xmlns:p14="http://schemas.microsoft.com/office/powerpoint/2010/main" val="59944253"/>
       </p:ext>
     </p:extLst>
   </p:cSld>

</xml_diff>